<commit_message>
fixed some mistakes and added font reference
</commit_message>
<xml_diff>
--- a/6 - Generalization Bounds/Additional Material - VC dimension.pptx
+++ b/6 - Generalization Bounds/Additional Material - VC dimension.pptx
@@ -141,137 +141,15 @@
 </p:cmAuthorLst>
 </file>
 
-<file path=ppt/revisionInfo.xml><?xml version="1.0" encoding="utf-8"?>
-<p1510:revInfo xmlns:a="http://schemas.openxmlformats.org/drawingml/2006/main" xmlns:r="http://schemas.openxmlformats.org/officeDocument/2006/relationships" xmlns:p1510="http://schemas.microsoft.com/office/powerpoint/2015/10/main">
-  <p1510:revLst>
-    <p1510:client id="{2D17E00D-65D0-46D2-84C6-DFE6D8D46D57}" v="8" dt="2026-01-14T18:55:44.620"/>
-    <p1510:client id="{C3599669-46BF-4228-9017-DF04E9F8C2C5}" v="5256" dt="2026-01-14T15:42:04.235"/>
-  </p1510:revLst>
-</p1510:revInfo>
-</file>
-
 <file path=ppt/changesInfos/changesInfo1.xml><?xml version="1.0" encoding="utf-8"?>
 <pc:chgInfo xmlns:a="http://schemas.openxmlformats.org/drawingml/2006/main" xmlns:r="http://schemas.openxmlformats.org/officeDocument/2006/relationships" xmlns:ac="http://schemas.microsoft.com/office/drawing/2013/main/command" xmlns:pc="http://schemas.microsoft.com/office/powerpoint/2013/main/command">
   <pc:docChgLst>
     <pc:chgData name="Dominik Dold" userId="f2e3d405450aa2f4" providerId="LiveId" clId="{5805CB45-291F-49AE-A1B6-715AA1DB6F91}"/>
-    <pc:docChg chg="undo redo custSel addSld delSld modSld sldOrd">
-      <pc:chgData name="Dominik Dold" userId="f2e3d405450aa2f4" providerId="LiveId" clId="{5805CB45-291F-49AE-A1B6-715AA1DB6F91}" dt="2026-01-14T18:55:52.336" v="49165" actId="1076"/>
+    <pc:docChg chg="undo redo custSel addSld delSld modSld sldOrd modMainMaster">
+      <pc:chgData name="Dominik Dold" userId="f2e3d405450aa2f4" providerId="LiveId" clId="{5805CB45-291F-49AE-A1B6-715AA1DB6F91}" dt="2026-01-19T16:34:15.651" v="49171" actId="478"/>
       <pc:docMkLst>
         <pc:docMk/>
       </pc:docMkLst>
-      <pc:sldChg chg="addSp delSp modSp del mod">
-        <pc:chgData name="Dominik Dold" userId="f2e3d405450aa2f4" providerId="LiveId" clId="{5805CB45-291F-49AE-A1B6-715AA1DB6F91}" dt="2026-01-14T18:54:30.299" v="49126" actId="47"/>
-        <pc:sldMkLst>
-          <pc:docMk/>
-          <pc:sldMk cId="1605938876" sldId="256"/>
-        </pc:sldMkLst>
-      </pc:sldChg>
-      <pc:sldChg chg="addSp modSp del mod">
-        <pc:chgData name="Dominik Dold" userId="f2e3d405450aa2f4" providerId="LiveId" clId="{5805CB45-291F-49AE-A1B6-715AA1DB6F91}" dt="2026-01-14T18:54:30.299" v="49126" actId="47"/>
-        <pc:sldMkLst>
-          <pc:docMk/>
-          <pc:sldMk cId="2380572199" sldId="260"/>
-        </pc:sldMkLst>
-        <pc:spChg chg="add mod">
-          <ac:chgData name="Dominik Dold" userId="f2e3d405450aa2f4" providerId="LiveId" clId="{5805CB45-291F-49AE-A1B6-715AA1DB6F91}" dt="2026-01-14T13:10:08.097" v="45887" actId="20577"/>
-          <ac:spMkLst>
-            <pc:docMk/>
-            <pc:sldMk cId="2380572199" sldId="260"/>
-            <ac:spMk id="4" creationId="{715E4B87-6CEE-BDE4-3EAE-813E6CCA0951}"/>
-          </ac:spMkLst>
-        </pc:spChg>
-      </pc:sldChg>
-      <pc:sldChg chg="addSp delSp modSp add del mod delAnim modAnim">
-        <pc:chgData name="Dominik Dold" userId="f2e3d405450aa2f4" providerId="LiveId" clId="{5805CB45-291F-49AE-A1B6-715AA1DB6F91}" dt="2026-01-14T18:54:30.299" v="49126" actId="47"/>
-        <pc:sldMkLst>
-          <pc:docMk/>
-          <pc:sldMk cId="1005364367" sldId="269"/>
-        </pc:sldMkLst>
-      </pc:sldChg>
-      <pc:sldChg chg="addSp delSp modSp new del mod delAnim modAnim">
-        <pc:chgData name="Dominik Dold" userId="f2e3d405450aa2f4" providerId="LiveId" clId="{5805CB45-291F-49AE-A1B6-715AA1DB6F91}" dt="2026-01-14T18:54:30.299" v="49126" actId="47"/>
-        <pc:sldMkLst>
-          <pc:docMk/>
-          <pc:sldMk cId="1209272489" sldId="299"/>
-        </pc:sldMkLst>
-      </pc:sldChg>
-      <pc:sldChg chg="addSp modSp new del mod modAnim">
-        <pc:chgData name="Dominik Dold" userId="f2e3d405450aa2f4" providerId="LiveId" clId="{5805CB45-291F-49AE-A1B6-715AA1DB6F91}" dt="2026-01-14T18:54:30.299" v="49126" actId="47"/>
-        <pc:sldMkLst>
-          <pc:docMk/>
-          <pc:sldMk cId="2802709155" sldId="345"/>
-        </pc:sldMkLst>
-        <pc:spChg chg="add mod">
-          <ac:chgData name="Dominik Dold" userId="f2e3d405450aa2f4" providerId="LiveId" clId="{5805CB45-291F-49AE-A1B6-715AA1DB6F91}" dt="2026-01-14T13:10:39.386" v="45894" actId="20577"/>
-          <ac:spMkLst>
-            <pc:docMk/>
-            <pc:sldMk cId="2802709155" sldId="345"/>
-            <ac:spMk id="8" creationId="{395F8AE7-77D4-9526-9817-6DEB3BB7D715}"/>
-          </ac:spMkLst>
-        </pc:spChg>
-      </pc:sldChg>
-      <pc:sldChg chg="addSp delSp modSp add del mod addAnim delAnim modAnim">
-        <pc:chgData name="Dominik Dold" userId="f2e3d405450aa2f4" providerId="LiveId" clId="{5805CB45-291F-49AE-A1B6-715AA1DB6F91}" dt="2026-01-14T18:54:30.299" v="49126" actId="47"/>
-        <pc:sldMkLst>
-          <pc:docMk/>
-          <pc:sldMk cId="3497195088" sldId="346"/>
-        </pc:sldMkLst>
-        <pc:spChg chg="add mod">
-          <ac:chgData name="Dominik Dold" userId="f2e3d405450aa2f4" providerId="LiveId" clId="{5805CB45-291F-49AE-A1B6-715AA1DB6F91}" dt="2026-01-13T13:19:40.924" v="42940" actId="1076"/>
-          <ac:spMkLst>
-            <pc:docMk/>
-            <pc:sldMk cId="3497195088" sldId="346"/>
-            <ac:spMk id="7" creationId="{54E13182-A1AD-FE12-8DD2-81BAC8976459}"/>
-          </ac:spMkLst>
-        </pc:spChg>
-        <pc:picChg chg="add mod">
-          <ac:chgData name="Dominik Dold" userId="f2e3d405450aa2f4" providerId="LiveId" clId="{5805CB45-291F-49AE-A1B6-715AA1DB6F91}" dt="2026-01-13T13:19:23.702" v="42939" actId="1076"/>
-          <ac:picMkLst>
-            <pc:docMk/>
-            <pc:sldMk cId="3497195088" sldId="346"/>
-            <ac:picMk id="1026" creationId="{07A3D431-8C16-D54D-2E52-FD11B2EF73CB}"/>
-          </ac:picMkLst>
-        </pc:picChg>
-      </pc:sldChg>
-      <pc:sldChg chg="addSp delSp modSp new del mod delAnim modAnim">
-        <pc:chgData name="Dominik Dold" userId="f2e3d405450aa2f4" providerId="LiveId" clId="{5805CB45-291F-49AE-A1B6-715AA1DB6F91}" dt="2026-01-14T18:54:30.299" v="49126" actId="47"/>
-        <pc:sldMkLst>
-          <pc:docMk/>
-          <pc:sldMk cId="3004122205" sldId="347"/>
-        </pc:sldMkLst>
-        <pc:spChg chg="add mod">
-          <ac:chgData name="Dominik Dold" userId="f2e3d405450aa2f4" providerId="LiveId" clId="{5805CB45-291F-49AE-A1B6-715AA1DB6F91}" dt="2026-01-13T13:20:10.372" v="42947" actId="20577"/>
-          <ac:spMkLst>
-            <pc:docMk/>
-            <pc:sldMk cId="3004122205" sldId="347"/>
-            <ac:spMk id="9" creationId="{484E7540-1DD7-7A3A-EA10-5EC81806F499}"/>
-          </ac:spMkLst>
-        </pc:spChg>
-        <pc:spChg chg="add mod">
-          <ac:chgData name="Dominik Dold" userId="f2e3d405450aa2f4" providerId="LiveId" clId="{5805CB45-291F-49AE-A1B6-715AA1DB6F91}" dt="2026-01-13T13:26:01.073" v="43108" actId="20577"/>
-          <ac:spMkLst>
-            <pc:docMk/>
-            <pc:sldMk cId="3004122205" sldId="347"/>
-            <ac:spMk id="26" creationId="{8ADE657B-5E37-7D51-7038-29260237E8D7}"/>
-          </ac:spMkLst>
-        </pc:spChg>
-        <pc:spChg chg="add mod ord">
-          <ac:chgData name="Dominik Dold" userId="f2e3d405450aa2f4" providerId="LiveId" clId="{5805CB45-291F-49AE-A1B6-715AA1DB6F91}" dt="2026-01-13T13:20:30.243" v="42966" actId="14100"/>
-          <ac:spMkLst>
-            <pc:docMk/>
-            <pc:sldMk cId="3004122205" sldId="347"/>
-            <ac:spMk id="27" creationId="{0A2A8E60-1E5B-1D38-E8DC-B7847DA48026}"/>
-          </ac:spMkLst>
-        </pc:spChg>
-        <pc:spChg chg="add mod">
-          <ac:chgData name="Dominik Dold" userId="f2e3d405450aa2f4" providerId="LiveId" clId="{5805CB45-291F-49AE-A1B6-715AA1DB6F91}" dt="2026-01-13T13:26:24.591" v="43119" actId="313"/>
-          <ac:spMkLst>
-            <pc:docMk/>
-            <pc:sldMk cId="3004122205" sldId="347"/>
-            <ac:spMk id="28" creationId="{3F192FF8-1910-52E7-D6E5-610295B04FEE}"/>
-          </ac:spMkLst>
-        </pc:spChg>
-      </pc:sldChg>
       <pc:sldChg chg="addSp delSp modSp add mod modAnim">
         <pc:chgData name="Dominik Dold" userId="f2e3d405450aa2f4" providerId="LiveId" clId="{5805CB45-291F-49AE-A1B6-715AA1DB6F91}" dt="2026-01-14T18:55:52.336" v="49165" actId="1076"/>
         <pc:sldMkLst>
@@ -718,1554 +596,83 @@
           </ac:cxnSpMkLst>
         </pc:cxnChg>
       </pc:sldChg>
-      <pc:sldChg chg="addSp delSp modSp new del mod ord modAnim">
-        <pc:chgData name="Dominik Dold" userId="f2e3d405450aa2f4" providerId="LiveId" clId="{5805CB45-291F-49AE-A1B6-715AA1DB6F91}" dt="2026-01-14T18:54:30.299" v="49126" actId="47"/>
-        <pc:sldMkLst>
+      <pc:sldMasterChg chg="modSldLayout">
+        <pc:chgData name="Dominik Dold" userId="f2e3d405450aa2f4" providerId="LiveId" clId="{5805CB45-291F-49AE-A1B6-715AA1DB6F91}" dt="2026-01-19T16:34:15.651" v="49171" actId="478"/>
+        <pc:sldMasterMkLst>
           <pc:docMk/>
-          <pc:sldMk cId="2242129806" sldId="350"/>
-        </pc:sldMkLst>
-        <pc:spChg chg="add mod">
-          <ac:chgData name="Dominik Dold" userId="f2e3d405450aa2f4" providerId="LiveId" clId="{5805CB45-291F-49AE-A1B6-715AA1DB6F91}" dt="2026-01-13T13:26:34.670" v="43121" actId="313"/>
-          <ac:spMkLst>
+          <pc:sldMasterMk cId="3647615518" sldId="2147483730"/>
+        </pc:sldMasterMkLst>
+        <pc:sldLayoutChg chg="delSp mod">
+          <pc:chgData name="Dominik Dold" userId="f2e3d405450aa2f4" providerId="LiveId" clId="{5805CB45-291F-49AE-A1B6-715AA1DB6F91}" dt="2026-01-19T16:34:15.651" v="49171" actId="478"/>
+          <pc:sldLayoutMkLst>
             <pc:docMk/>
-            <pc:sldMk cId="2242129806" sldId="350"/>
-            <ac:spMk id="4" creationId="{7A71D9B3-C046-CAD9-556A-F442D2F69B08}"/>
-          </ac:spMkLst>
-        </pc:spChg>
-        <pc:spChg chg="add mod">
-          <ac:chgData name="Dominik Dold" userId="f2e3d405450aa2f4" providerId="LiveId" clId="{5805CB45-291F-49AE-A1B6-715AA1DB6F91}" dt="2026-01-13T15:49:11.936" v="44055" actId="20577"/>
-          <ac:spMkLst>
+            <pc:sldMasterMk cId="3647615518" sldId="2147483730"/>
+            <pc:sldLayoutMk cId="3775332565" sldId="2147483733"/>
+          </pc:sldLayoutMkLst>
+          <pc:spChg chg="del">
+            <ac:chgData name="Dominik Dold" userId="f2e3d405450aa2f4" providerId="LiveId" clId="{5805CB45-291F-49AE-A1B6-715AA1DB6F91}" dt="2026-01-19T16:34:14.707" v="49169" actId="478"/>
+            <ac:spMkLst>
+              <pc:docMk/>
+              <pc:sldMasterMk cId="3647615518" sldId="2147483730"/>
+              <pc:sldLayoutMk cId="3775332565" sldId="2147483733"/>
+              <ac:spMk id="8" creationId="{F26C7911-7E19-CC38-D210-8AA48256FC58}"/>
+            </ac:spMkLst>
+          </pc:spChg>
+          <pc:grpChg chg="del">
+            <ac:chgData name="Dominik Dold" userId="f2e3d405450aa2f4" providerId="LiveId" clId="{5805CB45-291F-49AE-A1B6-715AA1DB6F91}" dt="2026-01-19T16:34:15.651" v="49171" actId="478"/>
+            <ac:grpSpMkLst>
+              <pc:docMk/>
+              <pc:sldMasterMk cId="3647615518" sldId="2147483730"/>
+              <pc:sldLayoutMk cId="3775332565" sldId="2147483733"/>
+              <ac:grpSpMk id="13" creationId="{EC79674F-EEE7-A3F7-E7B6-E090E34DAE77}"/>
+            </ac:grpSpMkLst>
+          </pc:grpChg>
+          <pc:picChg chg="del">
+            <ac:chgData name="Dominik Dold" userId="f2e3d405450aa2f4" providerId="LiveId" clId="{5805CB45-291F-49AE-A1B6-715AA1DB6F91}" dt="2026-01-19T16:34:15.125" v="49170" actId="478"/>
+            <ac:picMkLst>
+              <pc:docMk/>
+              <pc:sldMasterMk cId="3647615518" sldId="2147483730"/>
+              <pc:sldLayoutMk cId="3775332565" sldId="2147483733"/>
+              <ac:picMk id="7" creationId="{71D72719-C124-A965-D48D-9233DB44E3E0}"/>
+            </ac:picMkLst>
+          </pc:picChg>
+        </pc:sldLayoutChg>
+        <pc:sldLayoutChg chg="delSp mod">
+          <pc:chgData name="Dominik Dold" userId="f2e3d405450aa2f4" providerId="LiveId" clId="{5805CB45-291F-49AE-A1B6-715AA1DB6F91}" dt="2026-01-19T16:34:13.401" v="49168" actId="478"/>
+          <pc:sldLayoutMkLst>
             <pc:docMk/>
-            <pc:sldMk cId="2242129806" sldId="350"/>
-            <ac:spMk id="6" creationId="{3E290793-F5AD-2259-CE48-BD3CBFB6F200}"/>
-          </ac:spMkLst>
-        </pc:spChg>
-      </pc:sldChg>
-      <pc:sldChg chg="addSp modSp new del mod ord">
-        <pc:chgData name="Dominik Dold" userId="f2e3d405450aa2f4" providerId="LiveId" clId="{5805CB45-291F-49AE-A1B6-715AA1DB6F91}" dt="2026-01-14T18:54:30.299" v="49126" actId="47"/>
-        <pc:sldMkLst>
-          <pc:docMk/>
-          <pc:sldMk cId="676430590" sldId="351"/>
-        </pc:sldMkLst>
-      </pc:sldChg>
-      <pc:sldChg chg="addSp delSp modSp add del mod ord">
-        <pc:chgData name="Dominik Dold" userId="f2e3d405450aa2f4" providerId="LiveId" clId="{5805CB45-291F-49AE-A1B6-715AA1DB6F91}" dt="2026-01-14T18:54:30.299" v="49126" actId="47"/>
-        <pc:sldMkLst>
-          <pc:docMk/>
-          <pc:sldMk cId="146593771" sldId="352"/>
-        </pc:sldMkLst>
-      </pc:sldChg>
-      <pc:sldChg chg="addSp delSp modSp add del mod ord">
-        <pc:chgData name="Dominik Dold" userId="f2e3d405450aa2f4" providerId="LiveId" clId="{5805CB45-291F-49AE-A1B6-715AA1DB6F91}" dt="2026-01-14T18:54:30.299" v="49126" actId="47"/>
-        <pc:sldMkLst>
-          <pc:docMk/>
-          <pc:sldMk cId="4289648158" sldId="353"/>
-        </pc:sldMkLst>
-      </pc:sldChg>
-      <pc:sldChg chg="addSp delSp modSp add del mod ord">
-        <pc:chgData name="Dominik Dold" userId="f2e3d405450aa2f4" providerId="LiveId" clId="{5805CB45-291F-49AE-A1B6-715AA1DB6F91}" dt="2026-01-14T18:54:30.299" v="49126" actId="47"/>
-        <pc:sldMkLst>
-          <pc:docMk/>
-          <pc:sldMk cId="2712640076" sldId="354"/>
-        </pc:sldMkLst>
-      </pc:sldChg>
-      <pc:sldChg chg="addSp delSp modSp new del mod modAnim">
-        <pc:chgData name="Dominik Dold" userId="f2e3d405450aa2f4" providerId="LiveId" clId="{5805CB45-291F-49AE-A1B6-715AA1DB6F91}" dt="2026-01-14T18:54:30.299" v="49126" actId="47"/>
-        <pc:sldMkLst>
-          <pc:docMk/>
-          <pc:sldMk cId="3143805247" sldId="355"/>
-        </pc:sldMkLst>
-        <pc:spChg chg="mod">
-          <ac:chgData name="Dominik Dold" userId="f2e3d405450aa2f4" providerId="LiveId" clId="{5805CB45-291F-49AE-A1B6-715AA1DB6F91}" dt="2026-01-13T13:26:57.266" v="43153" actId="20577"/>
-          <ac:spMkLst>
-            <pc:docMk/>
-            <pc:sldMk cId="3143805247" sldId="355"/>
-            <ac:spMk id="2" creationId="{2E205674-F558-BD64-907D-73F6F5837FFF}"/>
-          </ac:spMkLst>
-        </pc:spChg>
-        <pc:spChg chg="add mod">
-          <ac:chgData name="Dominik Dold" userId="f2e3d405450aa2f4" providerId="LiveId" clId="{5805CB45-291F-49AE-A1B6-715AA1DB6F91}" dt="2026-01-13T16:16:19.130" v="44955" actId="20577"/>
-          <ac:spMkLst>
-            <pc:docMk/>
-            <pc:sldMk cId="3143805247" sldId="355"/>
-            <ac:spMk id="4" creationId="{8730BB3B-F06F-07B8-CBDE-09E983F0638C}"/>
-          </ac:spMkLst>
-        </pc:spChg>
-        <pc:spChg chg="add mod">
-          <ac:chgData name="Dominik Dold" userId="f2e3d405450aa2f4" providerId="LiveId" clId="{5805CB45-291F-49AE-A1B6-715AA1DB6F91}" dt="2026-01-13T15:49:56.863" v="44068" actId="14100"/>
-          <ac:spMkLst>
-            <pc:docMk/>
-            <pc:sldMk cId="3143805247" sldId="355"/>
-            <ac:spMk id="5" creationId="{C1529A6C-3058-F677-85E4-0061C7080BA0}"/>
-          </ac:spMkLst>
-        </pc:spChg>
-        <pc:spChg chg="add mod">
-          <ac:chgData name="Dominik Dold" userId="f2e3d405450aa2f4" providerId="LiveId" clId="{5805CB45-291F-49AE-A1B6-715AA1DB6F91}" dt="2026-01-13T15:49:51.781" v="44066" actId="1076"/>
-          <ac:spMkLst>
-            <pc:docMk/>
-            <pc:sldMk cId="3143805247" sldId="355"/>
-            <ac:spMk id="6" creationId="{618D083E-60E3-87B7-6CC8-42661EEB52DE}"/>
-          </ac:spMkLst>
-        </pc:spChg>
-        <pc:spChg chg="add del mod">
-          <ac:chgData name="Dominik Dold" userId="f2e3d405450aa2f4" providerId="LiveId" clId="{5805CB45-291F-49AE-A1B6-715AA1DB6F91}" dt="2026-01-13T15:11:10.790" v="43217" actId="478"/>
-          <ac:spMkLst>
-            <pc:docMk/>
-            <pc:sldMk cId="3143805247" sldId="355"/>
-            <ac:spMk id="7" creationId="{A0202445-3C57-8414-A2CB-6CBBB880FCD8}"/>
-          </ac:spMkLst>
-        </pc:spChg>
-        <pc:spChg chg="add del mod">
-          <ac:chgData name="Dominik Dold" userId="f2e3d405450aa2f4" providerId="LiveId" clId="{5805CB45-291F-49AE-A1B6-715AA1DB6F91}" dt="2026-01-13T15:11:10.790" v="43217" actId="478"/>
-          <ac:spMkLst>
-            <pc:docMk/>
-            <pc:sldMk cId="3143805247" sldId="355"/>
-            <ac:spMk id="8" creationId="{19EC9429-E2E6-7E25-8BFA-2D4D3AFA8054}"/>
-          </ac:spMkLst>
-        </pc:spChg>
-        <pc:spChg chg="add del mod">
-          <ac:chgData name="Dominik Dold" userId="f2e3d405450aa2f4" providerId="LiveId" clId="{5805CB45-291F-49AE-A1B6-715AA1DB6F91}" dt="2026-01-13T15:11:10.790" v="43217" actId="478"/>
-          <ac:spMkLst>
-            <pc:docMk/>
-            <pc:sldMk cId="3143805247" sldId="355"/>
-            <ac:spMk id="10" creationId="{7EF83949-251B-2EF2-6CEF-EC933D59C045}"/>
-          </ac:spMkLst>
-        </pc:spChg>
-        <pc:spChg chg="add mod">
-          <ac:chgData name="Dominik Dold" userId="f2e3d405450aa2f4" providerId="LiveId" clId="{5805CB45-291F-49AE-A1B6-715AA1DB6F91}" dt="2026-01-13T15:12:22.044" v="43252" actId="1076"/>
-          <ac:spMkLst>
-            <pc:docMk/>
-            <pc:sldMk cId="3143805247" sldId="355"/>
-            <ac:spMk id="11" creationId="{76840951-F695-073B-D187-988AB05F0F76}"/>
-          </ac:spMkLst>
-        </pc:spChg>
-        <pc:spChg chg="add mod">
-          <ac:chgData name="Dominik Dold" userId="f2e3d405450aa2f4" providerId="LiveId" clId="{5805CB45-291F-49AE-A1B6-715AA1DB6F91}" dt="2026-01-13T15:12:22.044" v="43252" actId="1076"/>
-          <ac:spMkLst>
-            <pc:docMk/>
-            <pc:sldMk cId="3143805247" sldId="355"/>
-            <ac:spMk id="12" creationId="{C890FE9D-7B8D-ECFF-04B2-EB1E8FF123F0}"/>
-          </ac:spMkLst>
-        </pc:spChg>
-        <pc:spChg chg="add mod">
-          <ac:chgData name="Dominik Dold" userId="f2e3d405450aa2f4" providerId="LiveId" clId="{5805CB45-291F-49AE-A1B6-715AA1DB6F91}" dt="2026-01-13T15:29:44.414" v="43556" actId="1076"/>
-          <ac:spMkLst>
-            <pc:docMk/>
-            <pc:sldMk cId="3143805247" sldId="355"/>
-            <ac:spMk id="13" creationId="{0ED5AB9B-A578-E191-FAE1-3134F7DF17ED}"/>
-          </ac:spMkLst>
-        </pc:spChg>
-        <pc:spChg chg="add mod">
-          <ac:chgData name="Dominik Dold" userId="f2e3d405450aa2f4" providerId="LiveId" clId="{5805CB45-291F-49AE-A1B6-715AA1DB6F91}" dt="2026-01-13T15:12:45.939" v="43256" actId="1076"/>
-          <ac:spMkLst>
-            <pc:docMk/>
-            <pc:sldMk cId="3143805247" sldId="355"/>
-            <ac:spMk id="14" creationId="{78C34614-A66B-49E8-5418-40705545358A}"/>
-          </ac:spMkLst>
-        </pc:spChg>
-        <pc:spChg chg="add mod">
-          <ac:chgData name="Dominik Dold" userId="f2e3d405450aa2f4" providerId="LiveId" clId="{5805CB45-291F-49AE-A1B6-715AA1DB6F91}" dt="2026-01-13T15:12:45.939" v="43256" actId="1076"/>
-          <ac:spMkLst>
-            <pc:docMk/>
-            <pc:sldMk cId="3143805247" sldId="355"/>
-            <ac:spMk id="15" creationId="{6564F375-4152-08E3-5BF2-FBA960CE0CD4}"/>
-          </ac:spMkLst>
-        </pc:spChg>
-        <pc:spChg chg="add mod">
-          <ac:chgData name="Dominik Dold" userId="f2e3d405450aa2f4" providerId="LiveId" clId="{5805CB45-291F-49AE-A1B6-715AA1DB6F91}" dt="2026-01-13T15:12:57.406" v="43278" actId="1076"/>
-          <ac:spMkLst>
-            <pc:docMk/>
-            <pc:sldMk cId="3143805247" sldId="355"/>
-            <ac:spMk id="16" creationId="{D7123411-E6C3-C246-F228-11D5F116E56C}"/>
-          </ac:spMkLst>
-        </pc:spChg>
-        <pc:spChg chg="add mod">
-          <ac:chgData name="Dominik Dold" userId="f2e3d405450aa2f4" providerId="LiveId" clId="{5805CB45-291F-49AE-A1B6-715AA1DB6F91}" dt="2026-01-13T15:30:18.600" v="43591" actId="20577"/>
-          <ac:spMkLst>
-            <pc:docMk/>
-            <pc:sldMk cId="3143805247" sldId="355"/>
-            <ac:spMk id="17" creationId="{21A772FB-9DFA-7471-FDF9-C459C4B9370E}"/>
-          </ac:spMkLst>
-        </pc:spChg>
-        <pc:spChg chg="add mod ord">
-          <ac:chgData name="Dominik Dold" userId="f2e3d405450aa2f4" providerId="LiveId" clId="{5805CB45-291F-49AE-A1B6-715AA1DB6F91}" dt="2026-01-13T15:49:51.781" v="44066" actId="1076"/>
-          <ac:spMkLst>
-            <pc:docMk/>
-            <pc:sldMk cId="3143805247" sldId="355"/>
-            <ac:spMk id="18" creationId="{430DCAFF-30EC-B42B-BA87-FDFFB8A49C88}"/>
-          </ac:spMkLst>
-        </pc:spChg>
-        <pc:spChg chg="add mod">
-          <ac:chgData name="Dominik Dold" userId="f2e3d405450aa2f4" providerId="LiveId" clId="{5805CB45-291F-49AE-A1B6-715AA1DB6F91}" dt="2026-01-13T15:49:54.393" v="44067" actId="1076"/>
-          <ac:spMkLst>
-            <pc:docMk/>
-            <pc:sldMk cId="3143805247" sldId="355"/>
-            <ac:spMk id="19" creationId="{CD9EF0AF-53FE-EF83-6AF1-F1F850F3487A}"/>
-          </ac:spMkLst>
-        </pc:spChg>
-        <pc:cxnChg chg="add del mod">
-          <ac:chgData name="Dominik Dold" userId="f2e3d405450aa2f4" providerId="LiveId" clId="{5805CB45-291F-49AE-A1B6-715AA1DB6F91}" dt="2026-01-13T15:11:10.790" v="43217" actId="478"/>
-          <ac:cxnSpMkLst>
-            <pc:docMk/>
-            <pc:sldMk cId="3143805247" sldId="355"/>
-            <ac:cxnSpMk id="9" creationId="{659A50B3-DC87-3F29-F9ED-ADA9130D7D26}"/>
-          </ac:cxnSpMkLst>
-        </pc:cxnChg>
-      </pc:sldChg>
-      <pc:sldChg chg="addSp delSp modSp new del mod delAnim modAnim">
-        <pc:chgData name="Dominik Dold" userId="f2e3d405450aa2f4" providerId="LiveId" clId="{5805CB45-291F-49AE-A1B6-715AA1DB6F91}" dt="2026-01-14T18:54:30.299" v="49126" actId="47"/>
-        <pc:sldMkLst>
-          <pc:docMk/>
-          <pc:sldMk cId="2164648989" sldId="356"/>
-        </pc:sldMkLst>
-        <pc:spChg chg="mod">
-          <ac:chgData name="Dominik Dold" userId="f2e3d405450aa2f4" providerId="LiveId" clId="{5805CB45-291F-49AE-A1B6-715AA1DB6F91}" dt="2026-01-13T15:33:57.865" v="43805" actId="20577"/>
-          <ac:spMkLst>
-            <pc:docMk/>
-            <pc:sldMk cId="2164648989" sldId="356"/>
-            <ac:spMk id="2" creationId="{51D584DD-8650-2BB3-0C23-B86A709BBDFD}"/>
-          </ac:spMkLst>
-        </pc:spChg>
-        <pc:spChg chg="add mod">
-          <ac:chgData name="Dominik Dold" userId="f2e3d405450aa2f4" providerId="LiveId" clId="{5805CB45-291F-49AE-A1B6-715AA1DB6F91}" dt="2026-01-13T15:35:19.659" v="44046" actId="20577"/>
-          <ac:spMkLst>
-            <pc:docMk/>
-            <pc:sldMk cId="2164648989" sldId="356"/>
-            <ac:spMk id="4" creationId="{2E22AF5C-C7A1-2C31-41EE-658FED33006A}"/>
-          </ac:spMkLst>
-        </pc:spChg>
-        <pc:spChg chg="add mod">
-          <ac:chgData name="Dominik Dold" userId="f2e3d405450aa2f4" providerId="LiveId" clId="{5805CB45-291F-49AE-A1B6-715AA1DB6F91}" dt="2026-01-14T13:17:10.986" v="45895" actId="20577"/>
-          <ac:spMkLst>
-            <pc:docMk/>
-            <pc:sldMk cId="2164648989" sldId="356"/>
-            <ac:spMk id="5" creationId="{56E8346C-92A5-2385-E1C6-DE2C167FFDDE}"/>
-          </ac:spMkLst>
-        </pc:spChg>
-        <pc:spChg chg="add mod">
-          <ac:chgData name="Dominik Dold" userId="f2e3d405450aa2f4" providerId="LiveId" clId="{5805CB45-291F-49AE-A1B6-715AA1DB6F91}" dt="2026-01-13T16:08:49.063" v="44630" actId="1076"/>
-          <ac:spMkLst>
-            <pc:docMk/>
-            <pc:sldMk cId="2164648989" sldId="356"/>
-            <ac:spMk id="6" creationId="{6E6AE6D0-B123-1640-F923-38DB84089878}"/>
-          </ac:spMkLst>
-        </pc:spChg>
-        <pc:spChg chg="add del mod">
-          <ac:chgData name="Dominik Dold" userId="f2e3d405450aa2f4" providerId="LiveId" clId="{5805CB45-291F-49AE-A1B6-715AA1DB6F91}" dt="2026-01-14T15:40:52.847" v="49081" actId="478"/>
-          <ac:spMkLst>
-            <pc:docMk/>
-            <pc:sldMk cId="2164648989" sldId="356"/>
-            <ac:spMk id="9" creationId="{D77A543F-617D-0D78-0B37-491414AFBFD4}"/>
-          </ac:spMkLst>
-        </pc:spChg>
-        <pc:spChg chg="add del mod ord">
-          <ac:chgData name="Dominik Dold" userId="f2e3d405450aa2f4" providerId="LiveId" clId="{5805CB45-291F-49AE-A1B6-715AA1DB6F91}" dt="2026-01-14T15:40:52.847" v="49081" actId="478"/>
-          <ac:spMkLst>
-            <pc:docMk/>
-            <pc:sldMk cId="2164648989" sldId="356"/>
-            <ac:spMk id="10" creationId="{7D55368D-1BBC-0FF6-1B5D-7BB2CE5FB650}"/>
-          </ac:spMkLst>
-        </pc:spChg>
-        <pc:spChg chg="add mod">
-          <ac:chgData name="Dominik Dold" userId="f2e3d405450aa2f4" providerId="LiveId" clId="{5805CB45-291F-49AE-A1B6-715AA1DB6F91}" dt="2026-01-13T16:49:54.107" v="45729" actId="1076"/>
-          <ac:spMkLst>
-            <pc:docMk/>
-            <pc:sldMk cId="2164648989" sldId="356"/>
-            <ac:spMk id="11" creationId="{CCDDF326-989D-7CE7-DECB-EC6ECF9A9D43}"/>
-          </ac:spMkLst>
-        </pc:spChg>
-        <pc:spChg chg="add mod">
-          <ac:chgData name="Dominik Dold" userId="f2e3d405450aa2f4" providerId="LiveId" clId="{5805CB45-291F-49AE-A1B6-715AA1DB6F91}" dt="2026-01-13T16:51:46.814" v="45742" actId="20577"/>
-          <ac:spMkLst>
-            <pc:docMk/>
-            <pc:sldMk cId="2164648989" sldId="356"/>
-            <ac:spMk id="12" creationId="{3BD89FFB-7145-EAEB-A0DE-5645D3FF5359}"/>
-          </ac:spMkLst>
-        </pc:spChg>
-        <pc:spChg chg="add mod">
-          <ac:chgData name="Dominik Dold" userId="f2e3d405450aa2f4" providerId="LiveId" clId="{5805CB45-291F-49AE-A1B6-715AA1DB6F91}" dt="2026-01-13T16:49:54.107" v="45729" actId="1076"/>
-          <ac:spMkLst>
-            <pc:docMk/>
-            <pc:sldMk cId="2164648989" sldId="356"/>
-            <ac:spMk id="13" creationId="{CFA100DF-9ABF-0278-816B-75DE07988C99}"/>
-          </ac:spMkLst>
-        </pc:spChg>
-        <pc:spChg chg="add mod">
-          <ac:chgData name="Dominik Dold" userId="f2e3d405450aa2f4" providerId="LiveId" clId="{5805CB45-291F-49AE-A1B6-715AA1DB6F91}" dt="2026-01-13T16:14:03.736" v="44890" actId="1076"/>
-          <ac:spMkLst>
-            <pc:docMk/>
-            <pc:sldMk cId="2164648989" sldId="356"/>
-            <ac:spMk id="14" creationId="{84F9B7C1-FF24-2BAD-3E69-F4BE7B1184B2}"/>
-          </ac:spMkLst>
-        </pc:spChg>
-        <pc:spChg chg="add del mod">
-          <ac:chgData name="Dominik Dold" userId="f2e3d405450aa2f4" providerId="LiveId" clId="{5805CB45-291F-49AE-A1B6-715AA1DB6F91}" dt="2026-01-14T15:40:55.064" v="49082" actId="478"/>
-          <ac:spMkLst>
-            <pc:docMk/>
-            <pc:sldMk cId="2164648989" sldId="356"/>
-            <ac:spMk id="15" creationId="{70A27EB0-F19F-8A18-3E13-D420D655CF35}"/>
-          </ac:spMkLst>
-        </pc:spChg>
-        <pc:spChg chg="add mod">
-          <ac:chgData name="Dominik Dold" userId="f2e3d405450aa2f4" providerId="LiveId" clId="{5805CB45-291F-49AE-A1B6-715AA1DB6F91}" dt="2026-01-13T16:50:16.993" v="45733" actId="14100"/>
-          <ac:spMkLst>
-            <pc:docMk/>
-            <pc:sldMk cId="2164648989" sldId="356"/>
-            <ac:spMk id="16" creationId="{7A2262FE-1E99-378E-151F-9ACE60CC6A13}"/>
-          </ac:spMkLst>
-        </pc:spChg>
-        <pc:spChg chg="add mod">
-          <ac:chgData name="Dominik Dold" userId="f2e3d405450aa2f4" providerId="LiveId" clId="{5805CB45-291F-49AE-A1B6-715AA1DB6F91}" dt="2026-01-13T16:52:13.264" v="45792" actId="1076"/>
-          <ac:spMkLst>
-            <pc:docMk/>
-            <pc:sldMk cId="2164648989" sldId="356"/>
-            <ac:spMk id="17" creationId="{E09E8A6A-BFAF-1233-3969-8864F11A4C8F}"/>
-          </ac:spMkLst>
-        </pc:spChg>
-        <pc:picChg chg="add mod modCrop">
-          <ac:chgData name="Dominik Dold" userId="f2e3d405450aa2f4" providerId="LiveId" clId="{5805CB45-291F-49AE-A1B6-715AA1DB6F91}" dt="2026-01-14T15:41:28.631" v="49123" actId="732"/>
-          <ac:picMkLst>
-            <pc:docMk/>
-            <pc:sldMk cId="2164648989" sldId="356"/>
-            <ac:picMk id="8" creationId="{FBE4108C-2BE1-C40D-2928-7989019FCDF9}"/>
-          </ac:picMkLst>
-        </pc:picChg>
-      </pc:sldChg>
-      <pc:sldChg chg="addSp delSp modSp add del mod ord delAnim">
-        <pc:chgData name="Dominik Dold" userId="f2e3d405450aa2f4" providerId="LiveId" clId="{5805CB45-291F-49AE-A1B6-715AA1DB6F91}" dt="2026-01-14T18:54:30.299" v="49126" actId="47"/>
-        <pc:sldMkLst>
-          <pc:docMk/>
-          <pc:sldMk cId="2010022334" sldId="357"/>
-        </pc:sldMkLst>
-        <pc:spChg chg="mod">
-          <ac:chgData name="Dominik Dold" userId="f2e3d405450aa2f4" providerId="LiveId" clId="{5805CB45-291F-49AE-A1B6-715AA1DB6F91}" dt="2026-01-13T13:28:39.600" v="43205" actId="20577"/>
-          <ac:spMkLst>
-            <pc:docMk/>
-            <pc:sldMk cId="2010022334" sldId="357"/>
-            <ac:spMk id="2" creationId="{CFD81FDF-38D9-D2BE-49DC-E416F9E6C592}"/>
-          </ac:spMkLst>
-        </pc:spChg>
-        <pc:spChg chg="del">
-          <ac:chgData name="Dominik Dold" userId="f2e3d405450aa2f4" providerId="LiveId" clId="{5805CB45-291F-49AE-A1B6-715AA1DB6F91}" dt="2026-01-13T13:28:30.344" v="43155" actId="478"/>
-          <ac:spMkLst>
-            <pc:docMk/>
-            <pc:sldMk cId="2010022334" sldId="357"/>
-            <ac:spMk id="6" creationId="{96DE4122-1DB7-C636-B812-5C0C7D21B64C}"/>
-          </ac:spMkLst>
-        </pc:spChg>
-        <pc:spChg chg="del">
-          <ac:chgData name="Dominik Dold" userId="f2e3d405450aa2f4" providerId="LiveId" clId="{5805CB45-291F-49AE-A1B6-715AA1DB6F91}" dt="2026-01-13T13:28:30.344" v="43155" actId="478"/>
-          <ac:spMkLst>
-            <pc:docMk/>
-            <pc:sldMk cId="2010022334" sldId="357"/>
-            <ac:spMk id="7" creationId="{04F557C8-43E1-6BE6-1CC2-11A21712FED1}"/>
-          </ac:spMkLst>
-        </pc:spChg>
-        <pc:spChg chg="mod ord">
-          <ac:chgData name="Dominik Dold" userId="f2e3d405450aa2f4" providerId="LiveId" clId="{5805CB45-291F-49AE-A1B6-715AA1DB6F91}" dt="2026-01-14T13:31:02.380" v="46153" actId="164"/>
-          <ac:spMkLst>
-            <pc:docMk/>
-            <pc:sldMk cId="2010022334" sldId="357"/>
-            <ac:spMk id="8" creationId="{5A288A6C-A8B9-B049-40AE-EB055C3B21FF}"/>
-          </ac:spMkLst>
-        </pc:spChg>
-        <pc:spChg chg="del">
-          <ac:chgData name="Dominik Dold" userId="f2e3d405450aa2f4" providerId="LiveId" clId="{5805CB45-291F-49AE-A1B6-715AA1DB6F91}" dt="2026-01-13T13:28:30.344" v="43155" actId="478"/>
-          <ac:spMkLst>
-            <pc:docMk/>
-            <pc:sldMk cId="2010022334" sldId="357"/>
-            <ac:spMk id="8" creationId="{D3DD9242-CBC1-930E-E695-781B21EAB6CD}"/>
-          </ac:spMkLst>
-        </pc:spChg>
-        <pc:spChg chg="del">
-          <ac:chgData name="Dominik Dold" userId="f2e3d405450aa2f4" providerId="LiveId" clId="{5805CB45-291F-49AE-A1B6-715AA1DB6F91}" dt="2026-01-13T13:28:30.344" v="43155" actId="478"/>
-          <ac:spMkLst>
-            <pc:docMk/>
-            <pc:sldMk cId="2010022334" sldId="357"/>
-            <ac:spMk id="9" creationId="{6F31EF41-6EED-9C9D-6C09-A784B0433598}"/>
-          </ac:spMkLst>
-        </pc:spChg>
-        <pc:spChg chg="mod">
-          <ac:chgData name="Dominik Dold" userId="f2e3d405450aa2f4" providerId="LiveId" clId="{5805CB45-291F-49AE-A1B6-715AA1DB6F91}" dt="2026-01-14T13:31:02.380" v="46153" actId="164"/>
-          <ac:spMkLst>
-            <pc:docMk/>
-            <pc:sldMk cId="2010022334" sldId="357"/>
-            <ac:spMk id="9" creationId="{A040D206-5A2A-26CD-CAD4-08E7F3395134}"/>
-          </ac:spMkLst>
-        </pc:spChg>
-        <pc:spChg chg="del">
-          <ac:chgData name="Dominik Dold" userId="f2e3d405450aa2f4" providerId="LiveId" clId="{5805CB45-291F-49AE-A1B6-715AA1DB6F91}" dt="2026-01-14T13:24:55.451" v="45965" actId="478"/>
-          <ac:spMkLst>
-            <pc:docMk/>
-            <pc:sldMk cId="2010022334" sldId="357"/>
-            <ac:spMk id="10" creationId="{33359234-03CB-7B3C-FCEA-CC71B3265EBF}"/>
-          </ac:spMkLst>
-        </pc:spChg>
-        <pc:spChg chg="del">
-          <ac:chgData name="Dominik Dold" userId="f2e3d405450aa2f4" providerId="LiveId" clId="{5805CB45-291F-49AE-A1B6-715AA1DB6F91}" dt="2026-01-13T13:28:30.344" v="43155" actId="478"/>
-          <ac:spMkLst>
-            <pc:docMk/>
-            <pc:sldMk cId="2010022334" sldId="357"/>
-            <ac:spMk id="10" creationId="{EA900A0B-9586-1C08-509F-1B0E96793C0A}"/>
-          </ac:spMkLst>
-        </pc:spChg>
-        <pc:spChg chg="mod">
-          <ac:chgData name="Dominik Dold" userId="f2e3d405450aa2f4" providerId="LiveId" clId="{5805CB45-291F-49AE-A1B6-715AA1DB6F91}" dt="2026-01-14T13:31:02.380" v="46153" actId="164"/>
-          <ac:spMkLst>
-            <pc:docMk/>
-            <pc:sldMk cId="2010022334" sldId="357"/>
-            <ac:spMk id="11" creationId="{E5BA193F-9B77-A44B-9ABE-407C148654A5}"/>
-          </ac:spMkLst>
-        </pc:spChg>
-        <pc:spChg chg="mod">
-          <ac:chgData name="Dominik Dold" userId="f2e3d405450aa2f4" providerId="LiveId" clId="{5805CB45-291F-49AE-A1B6-715AA1DB6F91}" dt="2026-01-14T13:31:02.380" v="46153" actId="164"/>
-          <ac:spMkLst>
-            <pc:docMk/>
-            <pc:sldMk cId="2010022334" sldId="357"/>
-            <ac:spMk id="13" creationId="{F21C14F2-1E41-433F-32EF-05FBA9DA2F3F}"/>
-          </ac:spMkLst>
-        </pc:spChg>
-        <pc:spChg chg="mod">
-          <ac:chgData name="Dominik Dold" userId="f2e3d405450aa2f4" providerId="LiveId" clId="{5805CB45-291F-49AE-A1B6-715AA1DB6F91}" dt="2026-01-14T13:31:02.380" v="46153" actId="164"/>
-          <ac:spMkLst>
-            <pc:docMk/>
-            <pc:sldMk cId="2010022334" sldId="357"/>
-            <ac:spMk id="14" creationId="{6E948AAC-9166-90D6-39F5-0AF6FEBFAF6F}"/>
-          </ac:spMkLst>
-        </pc:spChg>
-        <pc:spChg chg="mod">
-          <ac:chgData name="Dominik Dold" userId="f2e3d405450aa2f4" providerId="LiveId" clId="{5805CB45-291F-49AE-A1B6-715AA1DB6F91}" dt="2026-01-14T13:28:22.567" v="46065" actId="14100"/>
-          <ac:spMkLst>
-            <pc:docMk/>
-            <pc:sldMk cId="2010022334" sldId="357"/>
-            <ac:spMk id="15" creationId="{83A0AD55-CF59-ECEB-B1A5-A6459873994D}"/>
-          </ac:spMkLst>
-        </pc:spChg>
-        <pc:spChg chg="mod">
-          <ac:chgData name="Dominik Dold" userId="f2e3d405450aa2f4" providerId="LiveId" clId="{5805CB45-291F-49AE-A1B6-715AA1DB6F91}" dt="2026-01-14T13:28:07.406" v="46064" actId="692"/>
-          <ac:spMkLst>
-            <pc:docMk/>
-            <pc:sldMk cId="2010022334" sldId="357"/>
-            <ac:spMk id="16" creationId="{04A15692-4B75-7CE5-3B30-8B6B0A945DDB}"/>
-          </ac:spMkLst>
-        </pc:spChg>
-        <pc:spChg chg="mod ord">
-          <ac:chgData name="Dominik Dold" userId="f2e3d405450aa2f4" providerId="LiveId" clId="{5805CB45-291F-49AE-A1B6-715AA1DB6F91}" dt="2026-01-14T13:24:28.110" v="45950" actId="207"/>
-          <ac:spMkLst>
-            <pc:docMk/>
-            <pc:sldMk cId="2010022334" sldId="357"/>
-            <ac:spMk id="17" creationId="{EDDD242F-2F5F-A3FB-A625-3299E9611479}"/>
-          </ac:spMkLst>
-        </pc:spChg>
-        <pc:spChg chg="mod ord">
-          <ac:chgData name="Dominik Dold" userId="f2e3d405450aa2f4" providerId="LiveId" clId="{5805CB45-291F-49AE-A1B6-715AA1DB6F91}" dt="2026-01-14T13:24:48.251" v="45963" actId="14100"/>
-          <ac:spMkLst>
-            <pc:docMk/>
-            <pc:sldMk cId="2010022334" sldId="357"/>
-            <ac:spMk id="18" creationId="{511BA136-B0DD-0EF2-596D-8B9F897FC99F}"/>
-          </ac:spMkLst>
-        </pc:spChg>
-        <pc:spChg chg="del">
-          <ac:chgData name="Dominik Dold" userId="f2e3d405450aa2f4" providerId="LiveId" clId="{5805CB45-291F-49AE-A1B6-715AA1DB6F91}" dt="2026-01-14T13:22:15.526" v="45909" actId="478"/>
-          <ac:spMkLst>
-            <pc:docMk/>
-            <pc:sldMk cId="2010022334" sldId="357"/>
-            <ac:spMk id="20" creationId="{51D5EE84-A96F-D43F-380C-13FD91EB3BB9}"/>
-          </ac:spMkLst>
-        </pc:spChg>
-        <pc:spChg chg="del">
-          <ac:chgData name="Dominik Dold" userId="f2e3d405450aa2f4" providerId="LiveId" clId="{5805CB45-291F-49AE-A1B6-715AA1DB6F91}" dt="2026-01-13T13:28:30.344" v="43155" actId="478"/>
-          <ac:spMkLst>
-            <pc:docMk/>
-            <pc:sldMk cId="2010022334" sldId="357"/>
-            <ac:spMk id="21" creationId="{DAD18AAC-45BE-4EAB-FCCF-800B9197C5B1}"/>
-          </ac:spMkLst>
-        </pc:spChg>
-        <pc:spChg chg="del">
-          <ac:chgData name="Dominik Dold" userId="f2e3d405450aa2f4" providerId="LiveId" clId="{5805CB45-291F-49AE-A1B6-715AA1DB6F91}" dt="2026-01-14T13:22:15.526" v="45909" actId="478"/>
-          <ac:spMkLst>
-            <pc:docMk/>
-            <pc:sldMk cId="2010022334" sldId="357"/>
-            <ac:spMk id="25" creationId="{E2DBD9A7-FA61-1DF8-6247-8BD6E0E11002}"/>
-          </ac:spMkLst>
-        </pc:spChg>
-        <pc:spChg chg="del">
-          <ac:chgData name="Dominik Dold" userId="f2e3d405450aa2f4" providerId="LiveId" clId="{5805CB45-291F-49AE-A1B6-715AA1DB6F91}" dt="2026-01-14T13:22:15.526" v="45909" actId="478"/>
-          <ac:spMkLst>
-            <pc:docMk/>
-            <pc:sldMk cId="2010022334" sldId="357"/>
-            <ac:spMk id="27" creationId="{306E89DC-3FB4-A1A3-217F-609EC670386F}"/>
-          </ac:spMkLst>
-        </pc:spChg>
-        <pc:spChg chg="del">
-          <ac:chgData name="Dominik Dold" userId="f2e3d405450aa2f4" providerId="LiveId" clId="{5805CB45-291F-49AE-A1B6-715AA1DB6F91}" dt="2026-01-14T13:22:15.526" v="45909" actId="478"/>
-          <ac:spMkLst>
-            <pc:docMk/>
-            <pc:sldMk cId="2010022334" sldId="357"/>
-            <ac:spMk id="29" creationId="{FDF05FC2-6FF6-D59F-B1F2-1EB0F9A3BAB5}"/>
-          </ac:spMkLst>
-        </pc:spChg>
-        <pc:spChg chg="del">
-          <ac:chgData name="Dominik Dold" userId="f2e3d405450aa2f4" providerId="LiveId" clId="{5805CB45-291F-49AE-A1B6-715AA1DB6F91}" dt="2026-01-14T13:22:15.526" v="45909" actId="478"/>
-          <ac:spMkLst>
-            <pc:docMk/>
-            <pc:sldMk cId="2010022334" sldId="357"/>
-            <ac:spMk id="32" creationId="{00122476-6E68-50F2-B901-5199FCCEB209}"/>
-          </ac:spMkLst>
-        </pc:spChg>
-        <pc:spChg chg="mod topLvl">
-          <ac:chgData name="Dominik Dold" userId="f2e3d405450aa2f4" providerId="LiveId" clId="{5805CB45-291F-49AE-A1B6-715AA1DB6F91}" dt="2026-01-14T13:21:54.902" v="45901" actId="165"/>
-          <ac:spMkLst>
-            <pc:docMk/>
-            <pc:sldMk cId="2010022334" sldId="357"/>
-            <ac:spMk id="33" creationId="{9D97FA78-D1FF-FCBE-0BC9-D8C972A031A5}"/>
-          </ac:spMkLst>
-        </pc:spChg>
-        <pc:spChg chg="del">
-          <ac:chgData name="Dominik Dold" userId="f2e3d405450aa2f4" providerId="LiveId" clId="{5805CB45-291F-49AE-A1B6-715AA1DB6F91}" dt="2026-01-14T13:22:15.526" v="45909" actId="478"/>
-          <ac:spMkLst>
-            <pc:docMk/>
-            <pc:sldMk cId="2010022334" sldId="357"/>
-            <ac:spMk id="34" creationId="{E6C00C5D-0456-C94C-1BB3-710579685711}"/>
-          </ac:spMkLst>
-        </pc:spChg>
-        <pc:spChg chg="mod topLvl">
-          <ac:chgData name="Dominik Dold" userId="f2e3d405450aa2f4" providerId="LiveId" clId="{5805CB45-291F-49AE-A1B6-715AA1DB6F91}" dt="2026-01-14T13:21:54.902" v="45901" actId="165"/>
-          <ac:spMkLst>
-            <pc:docMk/>
-            <pc:sldMk cId="2010022334" sldId="357"/>
-            <ac:spMk id="35" creationId="{6945ECB4-9AD5-478B-3605-0E382BE82009}"/>
-          </ac:spMkLst>
-        </pc:spChg>
-        <pc:spChg chg="del">
-          <ac:chgData name="Dominik Dold" userId="f2e3d405450aa2f4" providerId="LiveId" clId="{5805CB45-291F-49AE-A1B6-715AA1DB6F91}" dt="2026-01-14T13:22:15.526" v="45909" actId="478"/>
-          <ac:spMkLst>
-            <pc:docMk/>
-            <pc:sldMk cId="2010022334" sldId="357"/>
-            <ac:spMk id="37" creationId="{C8291928-6938-11EE-D360-96E4FC1A0E4D}"/>
-          </ac:spMkLst>
-        </pc:spChg>
-        <pc:spChg chg="del">
-          <ac:chgData name="Dominik Dold" userId="f2e3d405450aa2f4" providerId="LiveId" clId="{5805CB45-291F-49AE-A1B6-715AA1DB6F91}" dt="2026-01-14T13:22:15.526" v="45909" actId="478"/>
-          <ac:spMkLst>
-            <pc:docMk/>
-            <pc:sldMk cId="2010022334" sldId="357"/>
-            <ac:spMk id="39" creationId="{2F70CA59-8D77-B7B4-BFEF-90712F5D2099}"/>
-          </ac:spMkLst>
-        </pc:spChg>
-        <pc:spChg chg="del mod topLvl">
-          <ac:chgData name="Dominik Dold" userId="f2e3d405450aa2f4" providerId="LiveId" clId="{5805CB45-291F-49AE-A1B6-715AA1DB6F91}" dt="2026-01-14T13:22:15.526" v="45909" actId="478"/>
-          <ac:spMkLst>
-            <pc:docMk/>
-            <pc:sldMk cId="2010022334" sldId="357"/>
-            <ac:spMk id="40" creationId="{EC9C2679-161F-3C14-4568-B01535BA9725}"/>
-          </ac:spMkLst>
-        </pc:spChg>
-        <pc:spChg chg="del">
-          <ac:chgData name="Dominik Dold" userId="f2e3d405450aa2f4" providerId="LiveId" clId="{5805CB45-291F-49AE-A1B6-715AA1DB6F91}" dt="2026-01-14T13:22:15.526" v="45909" actId="478"/>
-          <ac:spMkLst>
-            <pc:docMk/>
-            <pc:sldMk cId="2010022334" sldId="357"/>
-            <ac:spMk id="42" creationId="{5390D4EF-975E-DDFF-5FB4-BFC3AFDFB04A}"/>
-          </ac:spMkLst>
-        </pc:spChg>
-        <pc:spChg chg="del">
-          <ac:chgData name="Dominik Dold" userId="f2e3d405450aa2f4" providerId="LiveId" clId="{5805CB45-291F-49AE-A1B6-715AA1DB6F91}" dt="2026-01-14T13:21:57.778" v="45902" actId="478"/>
-          <ac:spMkLst>
-            <pc:docMk/>
-            <pc:sldMk cId="2010022334" sldId="357"/>
-            <ac:spMk id="45" creationId="{7D84E076-8676-CE24-8C44-488B4CE10110}"/>
-          </ac:spMkLst>
-        </pc:spChg>
-        <pc:spChg chg="del">
-          <ac:chgData name="Dominik Dold" userId="f2e3d405450aa2f4" providerId="LiveId" clId="{5805CB45-291F-49AE-A1B6-715AA1DB6F91}" dt="2026-01-14T13:21:57.778" v="45902" actId="478"/>
-          <ac:spMkLst>
-            <pc:docMk/>
-            <pc:sldMk cId="2010022334" sldId="357"/>
-            <ac:spMk id="47" creationId="{80B36B55-AD94-3884-F9C3-36E65EFC4D44}"/>
-          </ac:spMkLst>
-        </pc:spChg>
-        <pc:spChg chg="mod topLvl">
-          <ac:chgData name="Dominik Dold" userId="f2e3d405450aa2f4" providerId="LiveId" clId="{5805CB45-291F-49AE-A1B6-715AA1DB6F91}" dt="2026-01-14T13:21:54.902" v="45901" actId="165"/>
-          <ac:spMkLst>
-            <pc:docMk/>
-            <pc:sldMk cId="2010022334" sldId="357"/>
-            <ac:spMk id="48" creationId="{CF208850-E6BA-2558-B1CB-03A9959D5F6C}"/>
-          </ac:spMkLst>
-        </pc:spChg>
-        <pc:spChg chg="del">
-          <ac:chgData name="Dominik Dold" userId="f2e3d405450aa2f4" providerId="LiveId" clId="{5805CB45-291F-49AE-A1B6-715AA1DB6F91}" dt="2026-01-14T13:21:57.778" v="45902" actId="478"/>
-          <ac:spMkLst>
-            <pc:docMk/>
-            <pc:sldMk cId="2010022334" sldId="357"/>
-            <ac:spMk id="49" creationId="{671F2ADC-3B70-61B1-A575-00F423547026}"/>
-          </ac:spMkLst>
-        </pc:spChg>
-        <pc:spChg chg="del">
-          <ac:chgData name="Dominik Dold" userId="f2e3d405450aa2f4" providerId="LiveId" clId="{5805CB45-291F-49AE-A1B6-715AA1DB6F91}" dt="2026-01-14T13:21:57.778" v="45902" actId="478"/>
-          <ac:spMkLst>
-            <pc:docMk/>
-            <pc:sldMk cId="2010022334" sldId="357"/>
-            <ac:spMk id="50" creationId="{F0E74DEC-C1F5-F8DD-EF3B-E4ED0E953D6A}"/>
-          </ac:spMkLst>
-        </pc:spChg>
-        <pc:spChg chg="del">
-          <ac:chgData name="Dominik Dold" userId="f2e3d405450aa2f4" providerId="LiveId" clId="{5805CB45-291F-49AE-A1B6-715AA1DB6F91}" dt="2026-01-14T13:21:57.778" v="45902" actId="478"/>
-          <ac:spMkLst>
-            <pc:docMk/>
-            <pc:sldMk cId="2010022334" sldId="357"/>
-            <ac:spMk id="52" creationId="{327C9FDE-30E2-D9E8-1F8B-ABAC9677477B}"/>
-          </ac:spMkLst>
-        </pc:spChg>
-        <pc:spChg chg="del">
-          <ac:chgData name="Dominik Dold" userId="f2e3d405450aa2f4" providerId="LiveId" clId="{5805CB45-291F-49AE-A1B6-715AA1DB6F91}" dt="2026-01-14T13:21:57.778" v="45902" actId="478"/>
-          <ac:spMkLst>
-            <pc:docMk/>
-            <pc:sldMk cId="2010022334" sldId="357"/>
-            <ac:spMk id="54" creationId="{1278B757-A05A-89EA-2820-A3093B734CA2}"/>
-          </ac:spMkLst>
-        </pc:spChg>
-        <pc:spChg chg="del">
-          <ac:chgData name="Dominik Dold" userId="f2e3d405450aa2f4" providerId="LiveId" clId="{5805CB45-291F-49AE-A1B6-715AA1DB6F91}" dt="2026-01-14T13:21:57.778" v="45902" actId="478"/>
-          <ac:spMkLst>
-            <pc:docMk/>
-            <pc:sldMk cId="2010022334" sldId="357"/>
-            <ac:spMk id="55" creationId="{F14922C9-B4E5-42AB-970A-9CAAA741C65D}"/>
-          </ac:spMkLst>
-        </pc:spChg>
-        <pc:spChg chg="del">
-          <ac:chgData name="Dominik Dold" userId="f2e3d405450aa2f4" providerId="LiveId" clId="{5805CB45-291F-49AE-A1B6-715AA1DB6F91}" dt="2026-01-14T13:21:57.778" v="45902" actId="478"/>
-          <ac:spMkLst>
-            <pc:docMk/>
-            <pc:sldMk cId="2010022334" sldId="357"/>
-            <ac:spMk id="56" creationId="{3343A7B9-00BD-94C3-BCD2-6F6F758A4015}"/>
-          </ac:spMkLst>
-        </pc:spChg>
-        <pc:spChg chg="del mod topLvl">
-          <ac:chgData name="Dominik Dold" userId="f2e3d405450aa2f4" providerId="LiveId" clId="{5805CB45-291F-49AE-A1B6-715AA1DB6F91}" dt="2026-01-14T13:21:57.778" v="45902" actId="478"/>
-          <ac:spMkLst>
-            <pc:docMk/>
-            <pc:sldMk cId="2010022334" sldId="357"/>
-            <ac:spMk id="59" creationId="{0CE92E92-EEB8-6C84-FF57-8FCCFE63FA03}"/>
-          </ac:spMkLst>
-        </pc:spChg>
-        <pc:spChg chg="del">
-          <ac:chgData name="Dominik Dold" userId="f2e3d405450aa2f4" providerId="LiveId" clId="{5805CB45-291F-49AE-A1B6-715AA1DB6F91}" dt="2026-01-14T13:21:57.778" v="45902" actId="478"/>
-          <ac:spMkLst>
-            <pc:docMk/>
-            <pc:sldMk cId="2010022334" sldId="357"/>
-            <ac:spMk id="63" creationId="{BE9FF12F-BD69-F2E0-BCC9-F62421606BDC}"/>
-          </ac:spMkLst>
-        </pc:spChg>
-        <pc:spChg chg="del mod">
-          <ac:chgData name="Dominik Dold" userId="f2e3d405450aa2f4" providerId="LiveId" clId="{5805CB45-291F-49AE-A1B6-715AA1DB6F91}" dt="2026-01-14T13:22:07.574" v="45905" actId="478"/>
-          <ac:spMkLst>
-            <pc:docMk/>
-            <pc:sldMk cId="2010022334" sldId="357"/>
-            <ac:spMk id="65" creationId="{C04E4EF4-B6C9-45AF-9776-71DD89E93588}"/>
-          </ac:spMkLst>
-        </pc:spChg>
-        <pc:spChg chg="del">
-          <ac:chgData name="Dominik Dold" userId="f2e3d405450aa2f4" providerId="LiveId" clId="{5805CB45-291F-49AE-A1B6-715AA1DB6F91}" dt="2026-01-14T13:21:59.491" v="45903" actId="478"/>
-          <ac:spMkLst>
-            <pc:docMk/>
-            <pc:sldMk cId="2010022334" sldId="357"/>
-            <ac:spMk id="69" creationId="{A1D758DE-83EE-4A16-249B-D542AA965FCA}"/>
-          </ac:spMkLst>
-        </pc:spChg>
-        <pc:spChg chg="del">
-          <ac:chgData name="Dominik Dold" userId="f2e3d405450aa2f4" providerId="LiveId" clId="{5805CB45-291F-49AE-A1B6-715AA1DB6F91}" dt="2026-01-14T13:21:59.491" v="45903" actId="478"/>
-          <ac:spMkLst>
-            <pc:docMk/>
-            <pc:sldMk cId="2010022334" sldId="357"/>
-            <ac:spMk id="70" creationId="{3C89FDFE-793F-0E77-7D93-EF9DF3C0CE9A}"/>
-          </ac:spMkLst>
-        </pc:spChg>
-        <pc:spChg chg="mod topLvl">
-          <ac:chgData name="Dominik Dold" userId="f2e3d405450aa2f4" providerId="LiveId" clId="{5805CB45-291F-49AE-A1B6-715AA1DB6F91}" dt="2026-01-14T13:21:54.902" v="45901" actId="165"/>
-          <ac:spMkLst>
-            <pc:docMk/>
-            <pc:sldMk cId="2010022334" sldId="357"/>
-            <ac:spMk id="71" creationId="{C8992DF8-3D08-67BB-2677-857E4E1BD83B}"/>
-          </ac:spMkLst>
-        </pc:spChg>
-        <pc:spChg chg="del mod topLvl">
-          <ac:chgData name="Dominik Dold" userId="f2e3d405450aa2f4" providerId="LiveId" clId="{5805CB45-291F-49AE-A1B6-715AA1DB6F91}" dt="2026-01-14T13:21:59.491" v="45903" actId="478"/>
-          <ac:spMkLst>
-            <pc:docMk/>
-            <pc:sldMk cId="2010022334" sldId="357"/>
-            <ac:spMk id="74" creationId="{C14AEFA5-5F14-11CC-D3E9-72077775E4BA}"/>
-          </ac:spMkLst>
-        </pc:spChg>
-        <pc:spChg chg="mod topLvl">
-          <ac:chgData name="Dominik Dold" userId="f2e3d405450aa2f4" providerId="LiveId" clId="{5805CB45-291F-49AE-A1B6-715AA1DB6F91}" dt="2026-01-14T13:21:54.902" v="45901" actId="165"/>
-          <ac:spMkLst>
-            <pc:docMk/>
-            <pc:sldMk cId="2010022334" sldId="357"/>
-            <ac:spMk id="75" creationId="{36184EC7-DBD9-0102-0FAA-39900B421806}"/>
-          </ac:spMkLst>
-        </pc:spChg>
-        <pc:spChg chg="del">
-          <ac:chgData name="Dominik Dold" userId="f2e3d405450aa2f4" providerId="LiveId" clId="{5805CB45-291F-49AE-A1B6-715AA1DB6F91}" dt="2026-01-14T13:21:59.491" v="45903" actId="478"/>
-          <ac:spMkLst>
-            <pc:docMk/>
-            <pc:sldMk cId="2010022334" sldId="357"/>
-            <ac:spMk id="76" creationId="{4690C26D-9CFC-6220-C04D-DC79B895D94D}"/>
-          </ac:spMkLst>
-        </pc:spChg>
-        <pc:spChg chg="del">
-          <ac:chgData name="Dominik Dold" userId="f2e3d405450aa2f4" providerId="LiveId" clId="{5805CB45-291F-49AE-A1B6-715AA1DB6F91}" dt="2026-01-14T13:21:59.491" v="45903" actId="478"/>
-          <ac:spMkLst>
-            <pc:docMk/>
-            <pc:sldMk cId="2010022334" sldId="357"/>
-            <ac:spMk id="78" creationId="{3DA3BEC5-AD81-0E2F-EFF4-FAD8BCA6ECE2}"/>
-          </ac:spMkLst>
-        </pc:spChg>
-        <pc:spChg chg="del mod topLvl">
-          <ac:chgData name="Dominik Dold" userId="f2e3d405450aa2f4" providerId="LiveId" clId="{5805CB45-291F-49AE-A1B6-715AA1DB6F91}" dt="2026-01-14T13:21:59.491" v="45903" actId="478"/>
-          <ac:spMkLst>
-            <pc:docMk/>
-            <pc:sldMk cId="2010022334" sldId="357"/>
-            <ac:spMk id="79" creationId="{3910E9BF-7B53-EDE7-132F-9584A173C1EF}"/>
-          </ac:spMkLst>
-        </pc:spChg>
-        <pc:spChg chg="del">
-          <ac:chgData name="Dominik Dold" userId="f2e3d405450aa2f4" providerId="LiveId" clId="{5805CB45-291F-49AE-A1B6-715AA1DB6F91}" dt="2026-01-14T13:21:59.491" v="45903" actId="478"/>
-          <ac:spMkLst>
-            <pc:docMk/>
-            <pc:sldMk cId="2010022334" sldId="357"/>
-            <ac:spMk id="80" creationId="{821938F4-222F-9CE7-3E6D-35E04AE39599}"/>
-          </ac:spMkLst>
-        </pc:spChg>
-        <pc:spChg chg="del">
-          <ac:chgData name="Dominik Dold" userId="f2e3d405450aa2f4" providerId="LiveId" clId="{5805CB45-291F-49AE-A1B6-715AA1DB6F91}" dt="2026-01-14T13:21:59.491" v="45903" actId="478"/>
-          <ac:spMkLst>
-            <pc:docMk/>
-            <pc:sldMk cId="2010022334" sldId="357"/>
-            <ac:spMk id="82" creationId="{39DDB62A-EDA5-8910-FE96-B21BE4BE33FE}"/>
-          </ac:spMkLst>
-        </pc:spChg>
-        <pc:spChg chg="del">
-          <ac:chgData name="Dominik Dold" userId="f2e3d405450aa2f4" providerId="LiveId" clId="{5805CB45-291F-49AE-A1B6-715AA1DB6F91}" dt="2026-01-14T13:21:59.491" v="45903" actId="478"/>
-          <ac:spMkLst>
-            <pc:docMk/>
-            <pc:sldMk cId="2010022334" sldId="357"/>
-            <ac:spMk id="85" creationId="{67F12084-97B2-B93A-ED6C-EC7C2FFE31FF}"/>
-          </ac:spMkLst>
-        </pc:spChg>
-        <pc:spChg chg="del">
-          <ac:chgData name="Dominik Dold" userId="f2e3d405450aa2f4" providerId="LiveId" clId="{5805CB45-291F-49AE-A1B6-715AA1DB6F91}" dt="2026-01-14T13:21:59.491" v="45903" actId="478"/>
-          <ac:spMkLst>
-            <pc:docMk/>
-            <pc:sldMk cId="2010022334" sldId="357"/>
-            <ac:spMk id="87" creationId="{D833C8F5-EAB5-913F-F238-58651A60F4E6}"/>
-          </ac:spMkLst>
-        </pc:spChg>
-        <pc:spChg chg="del">
-          <ac:chgData name="Dominik Dold" userId="f2e3d405450aa2f4" providerId="LiveId" clId="{5805CB45-291F-49AE-A1B6-715AA1DB6F91}" dt="2026-01-14T13:22:11.897" v="45907" actId="478"/>
-          <ac:spMkLst>
-            <pc:docMk/>
-            <pc:sldMk cId="2010022334" sldId="357"/>
-            <ac:spMk id="89" creationId="{B8E62F37-9454-D675-8A7E-9AA2F05065B1}"/>
-          </ac:spMkLst>
-        </pc:spChg>
-        <pc:spChg chg="mod">
-          <ac:chgData name="Dominik Dold" userId="f2e3d405450aa2f4" providerId="LiveId" clId="{5805CB45-291F-49AE-A1B6-715AA1DB6F91}" dt="2026-01-14T13:31:02.380" v="46153" actId="164"/>
-          <ac:spMkLst>
-            <pc:docMk/>
-            <pc:sldMk cId="2010022334" sldId="357"/>
-            <ac:spMk id="90" creationId="{3D25897C-1636-B4E6-8097-D03204F5AA8D}"/>
-          </ac:spMkLst>
-        </pc:spChg>
-        <pc:spChg chg="del">
-          <ac:chgData name="Dominik Dold" userId="f2e3d405450aa2f4" providerId="LiveId" clId="{5805CB45-291F-49AE-A1B6-715AA1DB6F91}" dt="2026-01-14T13:22:10.477" v="45906" actId="478"/>
-          <ac:spMkLst>
-            <pc:docMk/>
-            <pc:sldMk cId="2010022334" sldId="357"/>
-            <ac:spMk id="91" creationId="{7CE95A49-67DC-DD33-8C2C-3B5BC18EA1DC}"/>
-          </ac:spMkLst>
-        </pc:spChg>
-        <pc:spChg chg="del">
-          <ac:chgData name="Dominik Dold" userId="f2e3d405450aa2f4" providerId="LiveId" clId="{5805CB45-291F-49AE-A1B6-715AA1DB6F91}" dt="2026-01-14T13:22:12.832" v="45908" actId="478"/>
-          <ac:spMkLst>
-            <pc:docMk/>
-            <pc:sldMk cId="2010022334" sldId="357"/>
-            <ac:spMk id="92" creationId="{034F27B3-52E6-9C41-0385-B12A2A0BF181}"/>
-          </ac:spMkLst>
-        </pc:spChg>
-        <pc:spChg chg="del">
-          <ac:chgData name="Dominik Dold" userId="f2e3d405450aa2f4" providerId="LiveId" clId="{5805CB45-291F-49AE-A1B6-715AA1DB6F91}" dt="2026-01-14T13:22:17.447" v="45910" actId="478"/>
-          <ac:spMkLst>
-            <pc:docMk/>
-            <pc:sldMk cId="2010022334" sldId="357"/>
-            <ac:spMk id="93" creationId="{6DA62CA2-4DCF-E348-1406-07D8452962AD}"/>
-          </ac:spMkLst>
-        </pc:spChg>
-        <pc:spChg chg="del">
-          <ac:chgData name="Dominik Dold" userId="f2e3d405450aa2f4" providerId="LiveId" clId="{5805CB45-291F-49AE-A1B6-715AA1DB6F91}" dt="2026-01-14T13:22:17.447" v="45910" actId="478"/>
-          <ac:spMkLst>
-            <pc:docMk/>
-            <pc:sldMk cId="2010022334" sldId="357"/>
-            <ac:spMk id="102" creationId="{612AEA9C-D377-C088-FE3F-985122375CC4}"/>
-          </ac:spMkLst>
-        </pc:spChg>
-        <pc:spChg chg="del">
-          <ac:chgData name="Dominik Dold" userId="f2e3d405450aa2f4" providerId="LiveId" clId="{5805CB45-291F-49AE-A1B6-715AA1DB6F91}" dt="2026-01-14T13:22:17.447" v="45910" actId="478"/>
-          <ac:spMkLst>
-            <pc:docMk/>
-            <pc:sldMk cId="2010022334" sldId="357"/>
-            <ac:spMk id="103" creationId="{7DE0C11E-D1E7-C105-376F-CAD2CB2D4039}"/>
-          </ac:spMkLst>
-        </pc:spChg>
-        <pc:spChg chg="del">
-          <ac:chgData name="Dominik Dold" userId="f2e3d405450aa2f4" providerId="LiveId" clId="{5805CB45-291F-49AE-A1B6-715AA1DB6F91}" dt="2026-01-14T13:22:17.447" v="45910" actId="478"/>
-          <ac:spMkLst>
-            <pc:docMk/>
-            <pc:sldMk cId="2010022334" sldId="357"/>
-            <ac:spMk id="106" creationId="{E0909260-EA33-5A35-0B9C-96220050B0FC}"/>
-          </ac:spMkLst>
-        </pc:spChg>
-        <pc:spChg chg="del">
-          <ac:chgData name="Dominik Dold" userId="f2e3d405450aa2f4" providerId="LiveId" clId="{5805CB45-291F-49AE-A1B6-715AA1DB6F91}" dt="2026-01-14T13:22:17.447" v="45910" actId="478"/>
-          <ac:spMkLst>
-            <pc:docMk/>
-            <pc:sldMk cId="2010022334" sldId="357"/>
-            <ac:spMk id="109" creationId="{94300833-0A0D-CE43-BC3E-3B07330D9510}"/>
-          </ac:spMkLst>
-        </pc:spChg>
-        <pc:spChg chg="del">
-          <ac:chgData name="Dominik Dold" userId="f2e3d405450aa2f4" providerId="LiveId" clId="{5805CB45-291F-49AE-A1B6-715AA1DB6F91}" dt="2026-01-14T13:22:17.447" v="45910" actId="478"/>
-          <ac:spMkLst>
-            <pc:docMk/>
-            <pc:sldMk cId="2010022334" sldId="357"/>
-            <ac:spMk id="113" creationId="{97361740-2422-CB98-3506-A8F8E9805EB3}"/>
-          </ac:spMkLst>
-        </pc:spChg>
-        <pc:spChg chg="del mod topLvl">
-          <ac:chgData name="Dominik Dold" userId="f2e3d405450aa2f4" providerId="LiveId" clId="{5805CB45-291F-49AE-A1B6-715AA1DB6F91}" dt="2026-01-14T13:22:17.447" v="45910" actId="478"/>
-          <ac:spMkLst>
-            <pc:docMk/>
-            <pc:sldMk cId="2010022334" sldId="357"/>
-            <ac:spMk id="114" creationId="{17941E69-6CCF-8873-B97A-E6012F4230AA}"/>
-          </ac:spMkLst>
-        </pc:spChg>
-        <pc:spChg chg="del">
-          <ac:chgData name="Dominik Dold" userId="f2e3d405450aa2f4" providerId="LiveId" clId="{5805CB45-291F-49AE-A1B6-715AA1DB6F91}" dt="2026-01-14T13:22:17.447" v="45910" actId="478"/>
-          <ac:spMkLst>
-            <pc:docMk/>
-            <pc:sldMk cId="2010022334" sldId="357"/>
-            <ac:spMk id="120" creationId="{1F9C3C01-8ED8-FDA6-709E-DA96D1EAEE59}"/>
-          </ac:spMkLst>
-        </pc:spChg>
-        <pc:spChg chg="del">
-          <ac:chgData name="Dominik Dold" userId="f2e3d405450aa2f4" providerId="LiveId" clId="{5805CB45-291F-49AE-A1B6-715AA1DB6F91}" dt="2026-01-14T13:22:17.447" v="45910" actId="478"/>
-          <ac:spMkLst>
-            <pc:docMk/>
-            <pc:sldMk cId="2010022334" sldId="357"/>
-            <ac:spMk id="121" creationId="{D3D12207-69AD-1A41-96C6-B24261DF0F3D}"/>
-          </ac:spMkLst>
-        </pc:spChg>
-        <pc:spChg chg="del">
-          <ac:chgData name="Dominik Dold" userId="f2e3d405450aa2f4" providerId="LiveId" clId="{5805CB45-291F-49AE-A1B6-715AA1DB6F91}" dt="2026-01-14T13:22:17.447" v="45910" actId="478"/>
-          <ac:spMkLst>
-            <pc:docMk/>
-            <pc:sldMk cId="2010022334" sldId="357"/>
-            <ac:spMk id="122" creationId="{B8BCD61F-078C-1DB0-B9E7-EB1ED2C7B52F}"/>
-          </ac:spMkLst>
-        </pc:spChg>
-        <pc:spChg chg="del">
-          <ac:chgData name="Dominik Dold" userId="f2e3d405450aa2f4" providerId="LiveId" clId="{5805CB45-291F-49AE-A1B6-715AA1DB6F91}" dt="2026-01-14T13:24:55.451" v="45965" actId="478"/>
-          <ac:spMkLst>
-            <pc:docMk/>
-            <pc:sldMk cId="2010022334" sldId="357"/>
-            <ac:spMk id="123" creationId="{BF849071-C6E9-4AF8-1610-066D4BF7E149}"/>
-          </ac:spMkLst>
-        </pc:spChg>
-        <pc:spChg chg="mod">
-          <ac:chgData name="Dominik Dold" userId="f2e3d405450aa2f4" providerId="LiveId" clId="{5805CB45-291F-49AE-A1B6-715AA1DB6F91}" dt="2026-01-14T13:21:50.381" v="45900" actId="165"/>
-          <ac:spMkLst>
-            <pc:docMk/>
-            <pc:sldMk cId="2010022334" sldId="357"/>
-            <ac:spMk id="129" creationId="{D855F103-D23B-D0C2-33E5-6D50DB03DA77}"/>
-          </ac:spMkLst>
-        </pc:spChg>
-        <pc:spChg chg="mod">
-          <ac:chgData name="Dominik Dold" userId="f2e3d405450aa2f4" providerId="LiveId" clId="{5805CB45-291F-49AE-A1B6-715AA1DB6F91}" dt="2026-01-14T13:21:50.381" v="45900" actId="165"/>
-          <ac:spMkLst>
-            <pc:docMk/>
-            <pc:sldMk cId="2010022334" sldId="357"/>
-            <ac:spMk id="133" creationId="{712DB39A-6FD3-910C-6F64-3D5748E276FD}"/>
-          </ac:spMkLst>
-        </pc:spChg>
-        <pc:spChg chg="add mod">
-          <ac:chgData name="Dominik Dold" userId="f2e3d405450aa2f4" providerId="LiveId" clId="{5805CB45-291F-49AE-A1B6-715AA1DB6F91}" dt="2026-01-14T13:25:43.646" v="45994" actId="1076"/>
-          <ac:spMkLst>
-            <pc:docMk/>
-            <pc:sldMk cId="2010022334" sldId="357"/>
-            <ac:spMk id="139" creationId="{962D0327-6FE0-CBF5-C401-0DD34B191884}"/>
-          </ac:spMkLst>
-        </pc:spChg>
-        <pc:spChg chg="add mod">
-          <ac:chgData name="Dominik Dold" userId="f2e3d405450aa2f4" providerId="LiveId" clId="{5805CB45-291F-49AE-A1B6-715AA1DB6F91}" dt="2026-01-14T13:31:02.380" v="46153" actId="164"/>
-          <ac:spMkLst>
-            <pc:docMk/>
-            <pc:sldMk cId="2010022334" sldId="357"/>
-            <ac:spMk id="140" creationId="{0231D85B-E292-408F-51B0-4D6369FAC14B}"/>
-          </ac:spMkLst>
-        </pc:spChg>
-        <pc:spChg chg="add mod">
-          <ac:chgData name="Dominik Dold" userId="f2e3d405450aa2f4" providerId="LiveId" clId="{5805CB45-291F-49AE-A1B6-715AA1DB6F91}" dt="2026-01-14T13:31:02.380" v="46153" actId="164"/>
-          <ac:spMkLst>
-            <pc:docMk/>
-            <pc:sldMk cId="2010022334" sldId="357"/>
-            <ac:spMk id="141" creationId="{56CA9CA9-702B-D593-3262-759EC30281EC}"/>
-          </ac:spMkLst>
-        </pc:spChg>
-        <pc:spChg chg="add mod">
-          <ac:chgData name="Dominik Dold" userId="f2e3d405450aa2f4" providerId="LiveId" clId="{5805CB45-291F-49AE-A1B6-715AA1DB6F91}" dt="2026-01-14T13:27:23.296" v="46046" actId="1076"/>
-          <ac:spMkLst>
-            <pc:docMk/>
-            <pc:sldMk cId="2010022334" sldId="357"/>
-            <ac:spMk id="142" creationId="{EFD8F438-1E3A-CC44-A782-A64D7C971650}"/>
-          </ac:spMkLst>
-        </pc:spChg>
-        <pc:spChg chg="add mod">
-          <ac:chgData name="Dominik Dold" userId="f2e3d405450aa2f4" providerId="LiveId" clId="{5805CB45-291F-49AE-A1B6-715AA1DB6F91}" dt="2026-01-14T13:29:43.727" v="46097" actId="1076"/>
-          <ac:spMkLst>
-            <pc:docMk/>
-            <pc:sldMk cId="2010022334" sldId="357"/>
-            <ac:spMk id="148" creationId="{958EB2C5-486F-2375-5559-7B2F953296B9}"/>
-          </ac:spMkLst>
-        </pc:spChg>
-        <pc:spChg chg="add mod">
-          <ac:chgData name="Dominik Dold" userId="f2e3d405450aa2f4" providerId="LiveId" clId="{5805CB45-291F-49AE-A1B6-715AA1DB6F91}" dt="2026-01-14T13:31:02.380" v="46153" actId="164"/>
-          <ac:spMkLst>
-            <pc:docMk/>
-            <pc:sldMk cId="2010022334" sldId="357"/>
-            <ac:spMk id="149" creationId="{4595CB6E-8309-4E2E-8A1F-02041B0B35C4}"/>
-          </ac:spMkLst>
-        </pc:spChg>
-        <pc:spChg chg="add mod">
-          <ac:chgData name="Dominik Dold" userId="f2e3d405450aa2f4" providerId="LiveId" clId="{5805CB45-291F-49AE-A1B6-715AA1DB6F91}" dt="2026-01-14T13:30:30.788" v="46134" actId="1076"/>
-          <ac:spMkLst>
-            <pc:docMk/>
-            <pc:sldMk cId="2010022334" sldId="357"/>
-            <ac:spMk id="150" creationId="{02C23CE4-B4D7-1DD2-2390-8E96544E5333}"/>
-          </ac:spMkLst>
-        </pc:spChg>
-        <pc:spChg chg="add mod">
-          <ac:chgData name="Dominik Dold" userId="f2e3d405450aa2f4" providerId="LiveId" clId="{5805CB45-291F-49AE-A1B6-715AA1DB6F91}" dt="2026-01-14T13:31:02.380" v="46153" actId="164"/>
-          <ac:spMkLst>
-            <pc:docMk/>
-            <pc:sldMk cId="2010022334" sldId="357"/>
-            <ac:spMk id="151" creationId="{C80CBB76-C9E1-43C1-274E-CCF0F3397130}"/>
-          </ac:spMkLst>
-        </pc:spChg>
-        <pc:spChg chg="add del mod">
-          <ac:chgData name="Dominik Dold" userId="f2e3d405450aa2f4" providerId="LiveId" clId="{5805CB45-291F-49AE-A1B6-715AA1DB6F91}" dt="2026-01-14T13:30:57.106" v="46152" actId="478"/>
-          <ac:spMkLst>
-            <pc:docMk/>
-            <pc:sldMk cId="2010022334" sldId="357"/>
-            <ac:spMk id="152" creationId="{F75EA481-BBBB-A9CB-C029-EC2D7335E2C2}"/>
-          </ac:spMkLst>
-        </pc:spChg>
-        <pc:spChg chg="add del mod">
-          <ac:chgData name="Dominik Dold" userId="f2e3d405450aa2f4" providerId="LiveId" clId="{5805CB45-291F-49AE-A1B6-715AA1DB6F91}" dt="2026-01-14T15:37:14.613" v="49061" actId="478"/>
-          <ac:spMkLst>
-            <pc:docMk/>
-            <pc:sldMk cId="2010022334" sldId="357"/>
-            <ac:spMk id="154" creationId="{E687F430-D46D-9A96-3A0E-B010BEEA3D20}"/>
-          </ac:spMkLst>
-        </pc:spChg>
-        <pc:spChg chg="add mod">
-          <ac:chgData name="Dominik Dold" userId="f2e3d405450aa2f4" providerId="LiveId" clId="{5805CB45-291F-49AE-A1B6-715AA1DB6F91}" dt="2026-01-14T13:33:55.483" v="46689" actId="1076"/>
-          <ac:spMkLst>
-            <pc:docMk/>
-            <pc:sldMk cId="2010022334" sldId="357"/>
-            <ac:spMk id="155" creationId="{70546D52-B8E4-480B-D58E-A456D776A333}"/>
-          </ac:spMkLst>
-        </pc:spChg>
-        <pc:spChg chg="add del mod">
-          <ac:chgData name="Dominik Dold" userId="f2e3d405450aa2f4" providerId="LiveId" clId="{5805CB45-291F-49AE-A1B6-715AA1DB6F91}" dt="2026-01-14T15:31:49.011" v="48444" actId="478"/>
-          <ac:spMkLst>
-            <pc:docMk/>
-            <pc:sldMk cId="2010022334" sldId="357"/>
-            <ac:spMk id="156" creationId="{F6C15C38-CF5A-34EE-FF46-D50FD5C091B9}"/>
-          </ac:spMkLst>
-        </pc:spChg>
-        <pc:spChg chg="add del mod">
-          <ac:chgData name="Dominik Dold" userId="f2e3d405450aa2f4" providerId="LiveId" clId="{5805CB45-291F-49AE-A1B6-715AA1DB6F91}" dt="2026-01-14T15:31:49.011" v="48444" actId="478"/>
-          <ac:spMkLst>
-            <pc:docMk/>
-            <pc:sldMk cId="2010022334" sldId="357"/>
-            <ac:spMk id="157" creationId="{775C7835-D024-9AB9-CF36-1A3D7DF9C8A0}"/>
-          </ac:spMkLst>
-        </pc:spChg>
-        <pc:spChg chg="add del mod">
-          <ac:chgData name="Dominik Dold" userId="f2e3d405450aa2f4" providerId="LiveId" clId="{5805CB45-291F-49AE-A1B6-715AA1DB6F91}" dt="2026-01-14T15:31:49.011" v="48444" actId="478"/>
-          <ac:spMkLst>
-            <pc:docMk/>
-            <pc:sldMk cId="2010022334" sldId="357"/>
-            <ac:spMk id="158" creationId="{BB9A9C5D-E464-2358-A5A4-AF913FF4ECBE}"/>
-          </ac:spMkLst>
-        </pc:spChg>
-        <pc:spChg chg="add del mod">
-          <ac:chgData name="Dominik Dold" userId="f2e3d405450aa2f4" providerId="LiveId" clId="{5805CB45-291F-49AE-A1B6-715AA1DB6F91}" dt="2026-01-14T15:31:49.011" v="48444" actId="478"/>
-          <ac:spMkLst>
-            <pc:docMk/>
-            <pc:sldMk cId="2010022334" sldId="357"/>
-            <ac:spMk id="159" creationId="{0F4CD76F-4FC1-00BA-36BE-49B80BBAD32C}"/>
-          </ac:spMkLst>
-        </pc:spChg>
-        <pc:spChg chg="add del mod">
-          <ac:chgData name="Dominik Dold" userId="f2e3d405450aa2f4" providerId="LiveId" clId="{5805CB45-291F-49AE-A1B6-715AA1DB6F91}" dt="2026-01-14T13:36:32.100" v="46927"/>
-          <ac:spMkLst>
-            <pc:docMk/>
-            <pc:sldMk cId="2010022334" sldId="357"/>
-            <ac:spMk id="160" creationId="{4FBDC84A-97E0-36CA-D5F3-B4F76ACBAB38}"/>
-          </ac:spMkLst>
-        </pc:spChg>
-        <pc:spChg chg="add del mod">
-          <ac:chgData name="Dominik Dold" userId="f2e3d405450aa2f4" providerId="LiveId" clId="{5805CB45-291F-49AE-A1B6-715AA1DB6F91}" dt="2026-01-14T15:31:49.011" v="48444" actId="478"/>
-          <ac:spMkLst>
-            <pc:docMk/>
-            <pc:sldMk cId="2010022334" sldId="357"/>
-            <ac:spMk id="162" creationId="{650B5C38-6FF3-0829-A627-977475398CFB}"/>
-          </ac:spMkLst>
-        </pc:spChg>
-        <pc:spChg chg="add del mod">
-          <ac:chgData name="Dominik Dold" userId="f2e3d405450aa2f4" providerId="LiveId" clId="{5805CB45-291F-49AE-A1B6-715AA1DB6F91}" dt="2026-01-14T15:31:52.910" v="48445" actId="478"/>
-          <ac:spMkLst>
-            <pc:docMk/>
-            <pc:sldMk cId="2010022334" sldId="357"/>
-            <ac:spMk id="163" creationId="{A484742B-DF13-753E-B729-E519748888F7}"/>
-          </ac:spMkLst>
-        </pc:spChg>
-        <pc:spChg chg="add del">
-          <ac:chgData name="Dominik Dold" userId="f2e3d405450aa2f4" providerId="LiveId" clId="{5805CB45-291F-49AE-A1B6-715AA1DB6F91}" dt="2026-01-14T15:32:04.106" v="48447" actId="22"/>
-          <ac:spMkLst>
-            <pc:docMk/>
-            <pc:sldMk cId="2010022334" sldId="357"/>
-            <ac:spMk id="165" creationId="{DB57D6E9-2585-4479-7A5F-33F011CC8E60}"/>
-          </ac:spMkLst>
-        </pc:spChg>
-        <pc:spChg chg="mod topLvl">
-          <ac:chgData name="Dominik Dold" userId="f2e3d405450aa2f4" providerId="LiveId" clId="{5805CB45-291F-49AE-A1B6-715AA1DB6F91}" dt="2026-01-14T15:33:24.794" v="48464" actId="165"/>
-          <ac:spMkLst>
-            <pc:docMk/>
-            <pc:sldMk cId="2010022334" sldId="357"/>
-            <ac:spMk id="167" creationId="{9C23EA96-95BC-22C7-A081-3EDABFEB0B20}"/>
-          </ac:spMkLst>
-        </pc:spChg>
-        <pc:spChg chg="mod topLvl">
-          <ac:chgData name="Dominik Dold" userId="f2e3d405450aa2f4" providerId="LiveId" clId="{5805CB45-291F-49AE-A1B6-715AA1DB6F91}" dt="2026-01-14T15:33:24.794" v="48464" actId="165"/>
-          <ac:spMkLst>
-            <pc:docMk/>
-            <pc:sldMk cId="2010022334" sldId="357"/>
-            <ac:spMk id="168" creationId="{45C8ABA0-3179-0517-942F-E97C1E2A3FE0}"/>
-          </ac:spMkLst>
-        </pc:spChg>
-        <pc:spChg chg="del">
-          <ac:chgData name="Dominik Dold" userId="f2e3d405450aa2f4" providerId="LiveId" clId="{5805CB45-291F-49AE-A1B6-715AA1DB6F91}" dt="2026-01-14T15:32:38.668" v="48453" actId="478"/>
-          <ac:spMkLst>
-            <pc:docMk/>
-            <pc:sldMk cId="2010022334" sldId="357"/>
-            <ac:spMk id="169" creationId="{E6F7DD89-09EE-FB6D-7D37-FA0FF0A5B21C}"/>
-          </ac:spMkLst>
-        </pc:spChg>
-        <pc:spChg chg="mod">
-          <ac:chgData name="Dominik Dold" userId="f2e3d405450aa2f4" providerId="LiveId" clId="{5805CB45-291F-49AE-A1B6-715AA1DB6F91}" dt="2026-01-14T15:32:08.244" v="48448"/>
-          <ac:spMkLst>
-            <pc:docMk/>
-            <pc:sldMk cId="2010022334" sldId="357"/>
-            <ac:spMk id="170" creationId="{CEEF0F4C-A8DD-32AE-5A44-CD017DC3BCEA}"/>
-          </ac:spMkLst>
-        </pc:spChg>
-        <pc:spChg chg="mod topLvl">
-          <ac:chgData name="Dominik Dold" userId="f2e3d405450aa2f4" providerId="LiveId" clId="{5805CB45-291F-49AE-A1B6-715AA1DB6F91}" dt="2026-01-14T15:33:24.794" v="48464" actId="165"/>
-          <ac:spMkLst>
-            <pc:docMk/>
-            <pc:sldMk cId="2010022334" sldId="357"/>
-            <ac:spMk id="171" creationId="{845735F9-FCA3-7679-FB68-6D7AF93AFAC6}"/>
-          </ac:spMkLst>
-        </pc:spChg>
-        <pc:spChg chg="mod topLvl">
-          <ac:chgData name="Dominik Dold" userId="f2e3d405450aa2f4" providerId="LiveId" clId="{5805CB45-291F-49AE-A1B6-715AA1DB6F91}" dt="2026-01-14T15:33:24.794" v="48464" actId="165"/>
-          <ac:spMkLst>
-            <pc:docMk/>
-            <pc:sldMk cId="2010022334" sldId="357"/>
-            <ac:spMk id="172" creationId="{4A17110C-2992-D73A-20BA-9EAF039FFCF7}"/>
-          </ac:spMkLst>
-        </pc:spChg>
-        <pc:spChg chg="mod">
-          <ac:chgData name="Dominik Dold" userId="f2e3d405450aa2f4" providerId="LiveId" clId="{5805CB45-291F-49AE-A1B6-715AA1DB6F91}" dt="2026-01-14T15:32:08.244" v="48448"/>
-          <ac:spMkLst>
-            <pc:docMk/>
-            <pc:sldMk cId="2010022334" sldId="357"/>
-            <ac:spMk id="173" creationId="{F95C6167-EF30-D793-7B40-C52ADAB3AC2E}"/>
-          </ac:spMkLst>
-        </pc:spChg>
-        <pc:spChg chg="mod topLvl">
-          <ac:chgData name="Dominik Dold" userId="f2e3d405450aa2f4" providerId="LiveId" clId="{5805CB45-291F-49AE-A1B6-715AA1DB6F91}" dt="2026-01-14T15:33:24.794" v="48464" actId="165"/>
-          <ac:spMkLst>
-            <pc:docMk/>
-            <pc:sldMk cId="2010022334" sldId="357"/>
-            <ac:spMk id="174" creationId="{C0DEB2C4-C32B-50B4-4A0B-B0F4E01FDF11}"/>
-          </ac:spMkLst>
-        </pc:spChg>
-        <pc:spChg chg="mod topLvl">
-          <ac:chgData name="Dominik Dold" userId="f2e3d405450aa2f4" providerId="LiveId" clId="{5805CB45-291F-49AE-A1B6-715AA1DB6F91}" dt="2026-01-14T15:33:24.794" v="48464" actId="165"/>
-          <ac:spMkLst>
-            <pc:docMk/>
-            <pc:sldMk cId="2010022334" sldId="357"/>
-            <ac:spMk id="176" creationId="{09F2B676-16CC-FD91-046B-60204F6B7055}"/>
-          </ac:spMkLst>
-        </pc:spChg>
-        <pc:spChg chg="mod topLvl">
-          <ac:chgData name="Dominik Dold" userId="f2e3d405450aa2f4" providerId="LiveId" clId="{5805CB45-291F-49AE-A1B6-715AA1DB6F91}" dt="2026-01-14T15:33:24.794" v="48464" actId="165"/>
-          <ac:spMkLst>
-            <pc:docMk/>
-            <pc:sldMk cId="2010022334" sldId="357"/>
-            <ac:spMk id="177" creationId="{8396C8C1-66CD-8496-826A-5CDD4250722C}"/>
-          </ac:spMkLst>
-        </pc:spChg>
-        <pc:spChg chg="mod ord topLvl">
-          <ac:chgData name="Dominik Dold" userId="f2e3d405450aa2f4" providerId="LiveId" clId="{5805CB45-291F-49AE-A1B6-715AA1DB6F91}" dt="2026-01-14T15:33:38.850" v="48470" actId="1076"/>
-          <ac:spMkLst>
-            <pc:docMk/>
-            <pc:sldMk cId="2010022334" sldId="357"/>
-            <ac:spMk id="178" creationId="{C393E017-FD09-139A-C925-D561DE185A3C}"/>
-          </ac:spMkLst>
-        </pc:spChg>
-        <pc:spChg chg="mod ord">
-          <ac:chgData name="Dominik Dold" userId="f2e3d405450aa2f4" providerId="LiveId" clId="{5805CB45-291F-49AE-A1B6-715AA1DB6F91}" dt="2026-01-14T15:33:31.599" v="48467" actId="1076"/>
-          <ac:spMkLst>
-            <pc:docMk/>
-            <pc:sldMk cId="2010022334" sldId="357"/>
-            <ac:spMk id="179" creationId="{A9F0AA7E-88B6-F0E7-6C94-9B8B846A77F7}"/>
-          </ac:spMkLst>
-        </pc:spChg>
-        <pc:spChg chg="mod">
-          <ac:chgData name="Dominik Dold" userId="f2e3d405450aa2f4" providerId="LiveId" clId="{5805CB45-291F-49AE-A1B6-715AA1DB6F91}" dt="2026-01-14T15:32:08.244" v="48448"/>
-          <ac:spMkLst>
-            <pc:docMk/>
-            <pc:sldMk cId="2010022334" sldId="357"/>
-            <ac:spMk id="181" creationId="{3F2E7499-C66D-946C-BF99-2214830608D0}"/>
-          </ac:spMkLst>
-        </pc:spChg>
-        <pc:spChg chg="del mod">
-          <ac:chgData name="Dominik Dold" userId="f2e3d405450aa2f4" providerId="LiveId" clId="{5805CB45-291F-49AE-A1B6-715AA1DB6F91}" dt="2026-01-14T15:33:42.351" v="48471" actId="478"/>
-          <ac:spMkLst>
-            <pc:docMk/>
-            <pc:sldMk cId="2010022334" sldId="357"/>
-            <ac:spMk id="185" creationId="{012E7B6D-83BB-9364-452B-05DF9F18C9A7}"/>
-          </ac:spMkLst>
-        </pc:spChg>
-        <pc:spChg chg="del mod">
-          <ac:chgData name="Dominik Dold" userId="f2e3d405450aa2f4" providerId="LiveId" clId="{5805CB45-291F-49AE-A1B6-715AA1DB6F91}" dt="2026-01-14T15:32:40.847" v="48454" actId="478"/>
-          <ac:spMkLst>
-            <pc:docMk/>
-            <pc:sldMk cId="2010022334" sldId="357"/>
-            <ac:spMk id="186" creationId="{C689D5BC-4E33-F67D-2620-D95915EF7CC6}"/>
-          </ac:spMkLst>
-        </pc:spChg>
-        <pc:spChg chg="mod topLvl">
-          <ac:chgData name="Dominik Dold" userId="f2e3d405450aa2f4" providerId="LiveId" clId="{5805CB45-291F-49AE-A1B6-715AA1DB6F91}" dt="2026-01-14T15:33:24.794" v="48464" actId="165"/>
-          <ac:spMkLst>
-            <pc:docMk/>
-            <pc:sldMk cId="2010022334" sldId="357"/>
-            <ac:spMk id="187" creationId="{201C8E51-CFA6-B7A3-4A58-7E0762B9B82C}"/>
-          </ac:spMkLst>
-        </pc:spChg>
-        <pc:spChg chg="mod topLvl">
-          <ac:chgData name="Dominik Dold" userId="f2e3d405450aa2f4" providerId="LiveId" clId="{5805CB45-291F-49AE-A1B6-715AA1DB6F91}" dt="2026-01-14T15:33:24.794" v="48464" actId="165"/>
-          <ac:spMkLst>
-            <pc:docMk/>
-            <pc:sldMk cId="2010022334" sldId="357"/>
-            <ac:spMk id="188" creationId="{416777CD-0210-80B7-F5CE-C4C2D1AABDFE}"/>
-          </ac:spMkLst>
-        </pc:spChg>
-        <pc:spChg chg="add mod">
-          <ac:chgData name="Dominik Dold" userId="f2e3d405450aa2f4" providerId="LiveId" clId="{5805CB45-291F-49AE-A1B6-715AA1DB6F91}" dt="2026-01-14T15:33:09.843" v="48460" actId="2085"/>
-          <ac:spMkLst>
-            <pc:docMk/>
-            <pc:sldMk cId="2010022334" sldId="357"/>
-            <ac:spMk id="189" creationId="{8F16815F-DA3C-EBE2-53BD-51C2272681FD}"/>
-          </ac:spMkLst>
-        </pc:spChg>
-        <pc:spChg chg="add mod">
-          <ac:chgData name="Dominik Dold" userId="f2e3d405450aa2f4" providerId="LiveId" clId="{5805CB45-291F-49AE-A1B6-715AA1DB6F91}" dt="2026-01-14T15:37:15.009" v="49062"/>
-          <ac:spMkLst>
-            <pc:docMk/>
-            <pc:sldMk cId="2010022334" sldId="357"/>
-            <ac:spMk id="190" creationId="{707AF8A3-66B5-26AA-AE54-13532E21806A}"/>
-          </ac:spMkLst>
-        </pc:spChg>
-        <pc:grpChg chg="del">
-          <ac:chgData name="Dominik Dold" userId="f2e3d405450aa2f4" providerId="LiveId" clId="{5805CB45-291F-49AE-A1B6-715AA1DB6F91}" dt="2026-01-14T13:24:55.451" v="45965" actId="478"/>
-          <ac:grpSpMkLst>
-            <pc:docMk/>
-            <pc:sldMk cId="2010022334" sldId="357"/>
-            <ac:grpSpMk id="124" creationId="{2A907A44-D3EC-5809-AB58-629DD4C0AD20}"/>
-          </ac:grpSpMkLst>
-        </pc:grpChg>
-        <pc:grpChg chg="del">
-          <ac:chgData name="Dominik Dold" userId="f2e3d405450aa2f4" providerId="LiveId" clId="{5805CB45-291F-49AE-A1B6-715AA1DB6F91}" dt="2026-01-14T13:22:03.070" v="45904" actId="478"/>
-          <ac:grpSpMkLst>
-            <pc:docMk/>
-            <pc:sldMk cId="2010022334" sldId="357"/>
-            <ac:grpSpMk id="127" creationId="{C5C99B82-96C1-B96D-6C53-3D47F470BC69}"/>
-          </ac:grpSpMkLst>
-        </pc:grpChg>
-        <pc:grpChg chg="del">
-          <ac:chgData name="Dominik Dold" userId="f2e3d405450aa2f4" providerId="LiveId" clId="{5805CB45-291F-49AE-A1B6-715AA1DB6F91}" dt="2026-01-14T13:22:07.574" v="45905" actId="478"/>
-          <ac:grpSpMkLst>
-            <pc:docMk/>
-            <pc:sldMk cId="2010022334" sldId="357"/>
-            <ac:grpSpMk id="132" creationId="{E37F32FD-F431-12F7-F871-FCDD0FA95EAD}"/>
-          </ac:grpSpMkLst>
-        </pc:grpChg>
-        <pc:grpChg chg="del mod">
-          <ac:chgData name="Dominik Dold" userId="f2e3d405450aa2f4" providerId="LiveId" clId="{5805CB45-291F-49AE-A1B6-715AA1DB6F91}" dt="2026-01-14T15:31:49.011" v="48444" actId="478"/>
-          <ac:grpSpMkLst>
-            <pc:docMk/>
-            <pc:sldMk cId="2010022334" sldId="357"/>
-            <ac:grpSpMk id="153" creationId="{F547C11E-EC0A-883D-BCC1-CB6650705E70}"/>
-          </ac:grpSpMkLst>
-        </pc:grpChg>
-        <pc:grpChg chg="mod">
-          <ac:chgData name="Dominik Dold" userId="f2e3d405450aa2f4" providerId="LiveId" clId="{5805CB45-291F-49AE-A1B6-715AA1DB6F91}" dt="2026-01-14T15:32:21.257" v="48450" actId="1076"/>
-          <ac:grpSpMkLst>
-            <pc:docMk/>
-            <pc:sldMk cId="2010022334" sldId="357"/>
-            <ac:grpSpMk id="166" creationId="{E0FBEA5D-154B-F4F6-1ACB-20097C425CD9}"/>
-          </ac:grpSpMkLst>
-        </pc:grpChg>
-        <pc:picChg chg="add">
-          <ac:chgData name="Dominik Dold" userId="f2e3d405450aa2f4" providerId="LiveId" clId="{5805CB45-291F-49AE-A1B6-715AA1DB6F91}" dt="2026-01-14T13:21:20.080" v="45896" actId="22"/>
-          <ac:picMkLst>
-            <pc:docMk/>
-            <pc:sldMk cId="2010022334" sldId="357"/>
-            <ac:picMk id="5" creationId="{8AF7A62C-BF2E-DDE9-57C6-A836980D8712}"/>
-          </ac:picMkLst>
-        </pc:picChg>
-        <pc:cxnChg chg="del">
-          <ac:chgData name="Dominik Dold" userId="f2e3d405450aa2f4" providerId="LiveId" clId="{5805CB45-291F-49AE-A1B6-715AA1DB6F91}" dt="2026-01-13T13:28:30.344" v="43155" actId="478"/>
-          <ac:cxnSpMkLst>
-            <pc:docMk/>
-            <pc:sldMk cId="2010022334" sldId="357"/>
-            <ac:cxnSpMk id="18" creationId="{AD912036-DFB4-43C4-FAFB-E83CF169757F}"/>
-          </ac:cxnSpMkLst>
-        </pc:cxnChg>
-        <pc:cxnChg chg="add mod">
-          <ac:chgData name="Dominik Dold" userId="f2e3d405450aa2f4" providerId="LiveId" clId="{5805CB45-291F-49AE-A1B6-715AA1DB6F91}" dt="2026-01-14T15:31:49.011" v="48444" actId="478"/>
-          <ac:cxnSpMkLst>
-            <pc:docMk/>
-            <pc:sldMk cId="2010022334" sldId="357"/>
-            <ac:cxnSpMk id="144" creationId="{401B4579-BA41-0535-5673-7FD55742E913}"/>
-          </ac:cxnSpMkLst>
-        </pc:cxnChg>
-        <pc:cxnChg chg="add mod">
-          <ac:chgData name="Dominik Dold" userId="f2e3d405450aa2f4" providerId="LiveId" clId="{5805CB45-291F-49AE-A1B6-715AA1DB6F91}" dt="2026-01-14T13:29:20.017" v="46074" actId="692"/>
-          <ac:cxnSpMkLst>
-            <pc:docMk/>
-            <pc:sldMk cId="2010022334" sldId="357"/>
-            <ac:cxnSpMk id="145" creationId="{AA11E1ED-D317-3815-3BB7-8EEFD7DE41D4}"/>
-          </ac:cxnSpMkLst>
-        </pc:cxnChg>
-        <pc:cxnChg chg="add mod">
-          <ac:chgData name="Dominik Dold" userId="f2e3d405450aa2f4" providerId="LiveId" clId="{5805CB45-291F-49AE-A1B6-715AA1DB6F91}" dt="2026-01-14T15:31:49.011" v="48444" actId="478"/>
-          <ac:cxnSpMkLst>
-            <pc:docMk/>
-            <pc:sldMk cId="2010022334" sldId="357"/>
-            <ac:cxnSpMk id="147" creationId="{666A5245-51D1-B663-BC41-17B3BD8445B5}"/>
-          </ac:cxnSpMkLst>
-        </pc:cxnChg>
-        <pc:cxnChg chg="mod">
-          <ac:chgData name="Dominik Dold" userId="f2e3d405450aa2f4" providerId="LiveId" clId="{5805CB45-291F-49AE-A1B6-715AA1DB6F91}" dt="2026-01-14T15:32:38.668" v="48453" actId="478"/>
-          <ac:cxnSpMkLst>
-            <pc:docMk/>
-            <pc:sldMk cId="2010022334" sldId="357"/>
-            <ac:cxnSpMk id="184" creationId="{5309B23C-7B6B-57DF-1DD9-9586EED8C4F8}"/>
-          </ac:cxnSpMkLst>
-        </pc:cxnChg>
-      </pc:sldChg>
-      <pc:sldChg chg="addSp modSp new del mod modAnim">
-        <pc:chgData name="Dominik Dold" userId="f2e3d405450aa2f4" providerId="LiveId" clId="{5805CB45-291F-49AE-A1B6-715AA1DB6F91}" dt="2026-01-14T18:54:30.299" v="49126" actId="47"/>
-        <pc:sldMkLst>
-          <pc:docMk/>
-          <pc:sldMk cId="1635907736" sldId="358"/>
-        </pc:sldMkLst>
-        <pc:spChg chg="mod">
-          <ac:chgData name="Dominik Dold" userId="f2e3d405450aa2f4" providerId="LiveId" clId="{5805CB45-291F-49AE-A1B6-715AA1DB6F91}" dt="2026-01-13T16:14:56.664" v="44948" actId="20577"/>
-          <ac:spMkLst>
-            <pc:docMk/>
-            <pc:sldMk cId="1635907736" sldId="358"/>
-            <ac:spMk id="2" creationId="{B46CB635-CCB0-3E62-1637-38FA2AF97287}"/>
-          </ac:spMkLst>
-        </pc:spChg>
-        <pc:spChg chg="add mod">
-          <ac:chgData name="Dominik Dold" userId="f2e3d405450aa2f4" providerId="LiveId" clId="{5805CB45-291F-49AE-A1B6-715AA1DB6F91}" dt="2026-01-13T16:34:26.694" v="45352"/>
-          <ac:spMkLst>
-            <pc:docMk/>
-            <pc:sldMk cId="1635907736" sldId="358"/>
-            <ac:spMk id="4" creationId="{71E7C964-61BC-22AA-0D72-FFEF439A1EF5}"/>
-          </ac:spMkLst>
-        </pc:spChg>
-        <pc:spChg chg="add mod">
-          <ac:chgData name="Dominik Dold" userId="f2e3d405450aa2f4" providerId="LiveId" clId="{5805CB45-291F-49AE-A1B6-715AA1DB6F91}" dt="2026-01-13T16:35:28.777" v="45392" actId="20577"/>
-          <ac:spMkLst>
-            <pc:docMk/>
-            <pc:sldMk cId="1635907736" sldId="358"/>
-            <ac:spMk id="5" creationId="{7E5BE33B-E6A9-7375-2D70-21566C332E76}"/>
-          </ac:spMkLst>
-        </pc:spChg>
-        <pc:spChg chg="add mod">
-          <ac:chgData name="Dominik Dold" userId="f2e3d405450aa2f4" providerId="LiveId" clId="{5805CB45-291F-49AE-A1B6-715AA1DB6F91}" dt="2026-01-14T14:01:26.513" v="47062" actId="20577"/>
-          <ac:spMkLst>
-            <pc:docMk/>
-            <pc:sldMk cId="1635907736" sldId="358"/>
-            <ac:spMk id="6" creationId="{E0605B8A-FDDD-CCEA-D4AC-733D2C5D4DBE}"/>
-          </ac:spMkLst>
-        </pc:spChg>
-        <pc:spChg chg="add mod">
-          <ac:chgData name="Dominik Dold" userId="f2e3d405450aa2f4" providerId="LiveId" clId="{5805CB45-291F-49AE-A1B6-715AA1DB6F91}" dt="2026-01-14T14:02:05.346" v="47066" actId="20577"/>
-          <ac:spMkLst>
-            <pc:docMk/>
-            <pc:sldMk cId="1635907736" sldId="358"/>
-            <ac:spMk id="7" creationId="{F606A1E5-816C-E24D-4195-C486F3BC85AB}"/>
-          </ac:spMkLst>
-        </pc:spChg>
-        <pc:spChg chg="add mod">
-          <ac:chgData name="Dominik Dold" userId="f2e3d405450aa2f4" providerId="LiveId" clId="{5805CB45-291F-49AE-A1B6-715AA1DB6F91}" dt="2026-01-14T14:02:04.791" v="47065" actId="1076"/>
-          <ac:spMkLst>
-            <pc:docMk/>
-            <pc:sldMk cId="1635907736" sldId="358"/>
-            <ac:spMk id="8" creationId="{53C6E675-E8A3-AAC5-6D51-B57D5E1B71CB}"/>
-          </ac:spMkLst>
-        </pc:spChg>
-      </pc:sldChg>
-      <pc:sldChg chg="addSp delSp modSp add del mod modAnim">
-        <pc:chgData name="Dominik Dold" userId="f2e3d405450aa2f4" providerId="LiveId" clId="{5805CB45-291F-49AE-A1B6-715AA1DB6F91}" dt="2026-01-14T18:54:30.299" v="49126" actId="47"/>
-        <pc:sldMkLst>
-          <pc:docMk/>
-          <pc:sldMk cId="2311054438" sldId="359"/>
-        </pc:sldMkLst>
-        <pc:spChg chg="mod">
-          <ac:chgData name="Dominik Dold" userId="f2e3d405450aa2f4" providerId="LiveId" clId="{5805CB45-291F-49AE-A1B6-715AA1DB6F91}" dt="2026-01-14T15:30:57.022" v="48443" actId="20577"/>
-          <ac:spMkLst>
-            <pc:docMk/>
-            <pc:sldMk cId="2311054438" sldId="359"/>
-            <ac:spMk id="2" creationId="{6F9CDFF5-84FD-8C1D-4C32-DB6C0F102F19}"/>
-          </ac:spMkLst>
-        </pc:spChg>
-        <pc:spChg chg="add mod">
-          <ac:chgData name="Dominik Dold" userId="f2e3d405450aa2f4" providerId="LiveId" clId="{5805CB45-291F-49AE-A1B6-715AA1DB6F91}" dt="2026-01-14T15:28:07.239" v="48374" actId="20577"/>
-          <ac:spMkLst>
-            <pc:docMk/>
-            <pc:sldMk cId="2311054438" sldId="359"/>
-            <ac:spMk id="4" creationId="{6419CB31-2228-6922-64B6-B00FDFA8589F}"/>
-          </ac:spMkLst>
-        </pc:spChg>
-        <pc:spChg chg="add del mod">
-          <ac:chgData name="Dominik Dold" userId="f2e3d405450aa2f4" providerId="LiveId" clId="{5805CB45-291F-49AE-A1B6-715AA1DB6F91}" dt="2026-01-14T15:18:30.328" v="47603" actId="478"/>
-          <ac:spMkLst>
-            <pc:docMk/>
-            <pc:sldMk cId="2311054438" sldId="359"/>
-            <ac:spMk id="5" creationId="{D5123776-BA5D-5038-5D91-AF0C2DAAADC3}"/>
-          </ac:spMkLst>
-        </pc:spChg>
-        <pc:spChg chg="add mod">
-          <ac:chgData name="Dominik Dold" userId="f2e3d405450aa2f4" providerId="LiveId" clId="{5805CB45-291F-49AE-A1B6-715AA1DB6F91}" dt="2026-01-14T15:26:34.354" v="48110" actId="1076"/>
-          <ac:spMkLst>
-            <pc:docMk/>
-            <pc:sldMk cId="2311054438" sldId="359"/>
-            <ac:spMk id="6" creationId="{E11E48CC-5892-9A86-5A54-5D2BEA696C9F}"/>
-          </ac:spMkLst>
-        </pc:spChg>
-        <pc:spChg chg="add mod">
-          <ac:chgData name="Dominik Dold" userId="f2e3d405450aa2f4" providerId="LiveId" clId="{5805CB45-291F-49AE-A1B6-715AA1DB6F91}" dt="2026-01-14T15:29:22.680" v="48427" actId="20577"/>
-          <ac:spMkLst>
-            <pc:docMk/>
-            <pc:sldMk cId="2311054438" sldId="359"/>
-            <ac:spMk id="7" creationId="{F5DA0540-B1D1-EADD-5BDE-D7E34D5B89FB}"/>
-          </ac:spMkLst>
-        </pc:spChg>
-        <pc:spChg chg="add mod">
-          <ac:chgData name="Dominik Dold" userId="f2e3d405450aa2f4" providerId="LiveId" clId="{5805CB45-291F-49AE-A1B6-715AA1DB6F91}" dt="2026-01-14T15:24:40.863" v="48047" actId="113"/>
-          <ac:spMkLst>
-            <pc:docMk/>
-            <pc:sldMk cId="2311054438" sldId="359"/>
-            <ac:spMk id="10" creationId="{945E9434-6378-C06D-7C6A-BC37B7F6C1B3}"/>
-          </ac:spMkLst>
-        </pc:spChg>
-        <pc:spChg chg="add mod">
-          <ac:chgData name="Dominik Dold" userId="f2e3d405450aa2f4" providerId="LiveId" clId="{5805CB45-291F-49AE-A1B6-715AA1DB6F91}" dt="2026-01-14T15:26:34.354" v="48110" actId="1076"/>
-          <ac:spMkLst>
-            <pc:docMk/>
-            <pc:sldMk cId="2311054438" sldId="359"/>
-            <ac:spMk id="19" creationId="{6C916F2C-E71F-43FA-4B76-AC335F7773FF}"/>
-          </ac:spMkLst>
-        </pc:spChg>
-        <pc:spChg chg="add mod ord">
-          <ac:chgData name="Dominik Dold" userId="f2e3d405450aa2f4" providerId="LiveId" clId="{5805CB45-291F-49AE-A1B6-715AA1DB6F91}" dt="2026-01-14T15:24:16.556" v="48032" actId="167"/>
-          <ac:spMkLst>
-            <pc:docMk/>
-            <pc:sldMk cId="2311054438" sldId="359"/>
-            <ac:spMk id="20" creationId="{B6F9691A-FE14-8698-E1FD-20E44C76E4FF}"/>
-          </ac:spMkLst>
-        </pc:spChg>
-        <pc:spChg chg="add mod ord">
-          <ac:chgData name="Dominik Dold" userId="f2e3d405450aa2f4" providerId="LiveId" clId="{5805CB45-291F-49AE-A1B6-715AA1DB6F91}" dt="2026-01-14T15:26:34.354" v="48110" actId="1076"/>
-          <ac:spMkLst>
-            <pc:docMk/>
-            <pc:sldMk cId="2311054438" sldId="359"/>
-            <ac:spMk id="21" creationId="{CCEA6416-0C16-A767-ADA8-ED85C3DAC878}"/>
-          </ac:spMkLst>
-        </pc:spChg>
-        <pc:spChg chg="add del mod">
-          <ac:chgData name="Dominik Dold" userId="f2e3d405450aa2f4" providerId="LiveId" clId="{5805CB45-291F-49AE-A1B6-715AA1DB6F91}" dt="2026-01-14T15:26:59.285" v="48141" actId="478"/>
-          <ac:spMkLst>
-            <pc:docMk/>
-            <pc:sldMk cId="2311054438" sldId="359"/>
-            <ac:spMk id="22" creationId="{C8918AA1-5C39-EFA9-F978-12964716C4F3}"/>
-          </ac:spMkLst>
-        </pc:spChg>
-        <pc:spChg chg="add mod">
-          <ac:chgData name="Dominik Dold" userId="f2e3d405450aa2f4" providerId="LiveId" clId="{5805CB45-291F-49AE-A1B6-715AA1DB6F91}" dt="2026-01-14T15:37:19.269" v="49064"/>
-          <ac:spMkLst>
-            <pc:docMk/>
-            <pc:sldMk cId="2311054438" sldId="359"/>
-            <ac:spMk id="23" creationId="{FD770BDB-22EC-A2B3-6504-35A079E5B666}"/>
-          </ac:spMkLst>
-        </pc:spChg>
-        <pc:spChg chg="mod">
-          <ac:chgData name="Dominik Dold" userId="f2e3d405450aa2f4" providerId="LiveId" clId="{5805CB45-291F-49AE-A1B6-715AA1DB6F91}" dt="2026-01-14T15:23:12.063" v="48014" actId="1076"/>
-          <ac:spMkLst>
-            <pc:docMk/>
-            <pc:sldMk cId="2311054438" sldId="359"/>
-            <ac:spMk id="139" creationId="{AE22461E-344E-8BE7-D6D1-2E933A46C860}"/>
-          </ac:spMkLst>
-        </pc:spChg>
-        <pc:spChg chg="del mod">
-          <ac:chgData name="Dominik Dold" userId="f2e3d405450aa2f4" providerId="LiveId" clId="{5805CB45-291F-49AE-A1B6-715AA1DB6F91}" dt="2026-01-14T15:37:18.919" v="49063" actId="478"/>
-          <ac:spMkLst>
-            <pc:docMk/>
-            <pc:sldMk cId="2311054438" sldId="359"/>
-            <ac:spMk id="154" creationId="{FF8DD62A-88FB-6B9C-0735-1377C922E037}"/>
-          </ac:spMkLst>
-        </pc:spChg>
-        <pc:spChg chg="del">
-          <ac:chgData name="Dominik Dold" userId="f2e3d405450aa2f4" providerId="LiveId" clId="{5805CB45-291F-49AE-A1B6-715AA1DB6F91}" dt="2026-01-14T15:16:39.179" v="47414" actId="478"/>
-          <ac:spMkLst>
-            <pc:docMk/>
-            <pc:sldMk cId="2311054438" sldId="359"/>
-            <ac:spMk id="155" creationId="{FC350E56-32C2-D243-15D2-29D2CE12683F}"/>
-          </ac:spMkLst>
-        </pc:spChg>
-        <pc:spChg chg="mod">
-          <ac:chgData name="Dominik Dold" userId="f2e3d405450aa2f4" providerId="LiveId" clId="{5805CB45-291F-49AE-A1B6-715AA1DB6F91}" dt="2026-01-14T15:23:15.493" v="48015" actId="1076"/>
-          <ac:spMkLst>
-            <pc:docMk/>
-            <pc:sldMk cId="2311054438" sldId="359"/>
-            <ac:spMk id="156" creationId="{EFB470C6-466A-BBB0-4D20-7EAFC2E3238B}"/>
-          </ac:spMkLst>
-        </pc:spChg>
-        <pc:spChg chg="mod">
-          <ac:chgData name="Dominik Dold" userId="f2e3d405450aa2f4" providerId="LiveId" clId="{5805CB45-291F-49AE-A1B6-715AA1DB6F91}" dt="2026-01-14T15:23:15.493" v="48015" actId="1076"/>
-          <ac:spMkLst>
-            <pc:docMk/>
-            <pc:sldMk cId="2311054438" sldId="359"/>
-            <ac:spMk id="157" creationId="{63F99376-A839-1CA4-BCD1-1EBD04824BFB}"/>
-          </ac:spMkLst>
-        </pc:spChg>
-        <pc:spChg chg="mod">
-          <ac:chgData name="Dominik Dold" userId="f2e3d405450aa2f4" providerId="LiveId" clId="{5805CB45-291F-49AE-A1B6-715AA1DB6F91}" dt="2026-01-14T15:23:19.181" v="48016" actId="1076"/>
-          <ac:spMkLst>
-            <pc:docMk/>
-            <pc:sldMk cId="2311054438" sldId="359"/>
-            <ac:spMk id="158" creationId="{0D97FF2B-3A62-7EDE-ECA6-93379B69D1CF}"/>
-          </ac:spMkLst>
-        </pc:spChg>
-        <pc:spChg chg="mod">
-          <ac:chgData name="Dominik Dold" userId="f2e3d405450aa2f4" providerId="LiveId" clId="{5805CB45-291F-49AE-A1B6-715AA1DB6F91}" dt="2026-01-14T15:26:34.354" v="48110" actId="1076"/>
-          <ac:spMkLst>
-            <pc:docMk/>
-            <pc:sldMk cId="2311054438" sldId="359"/>
-            <ac:spMk id="159" creationId="{1AD42051-89C9-415F-A22C-0C0273D8ED79}"/>
-          </ac:spMkLst>
-        </pc:spChg>
-        <pc:spChg chg="mod">
-          <ac:chgData name="Dominik Dold" userId="f2e3d405450aa2f4" providerId="LiveId" clId="{5805CB45-291F-49AE-A1B6-715AA1DB6F91}" dt="2026-01-14T15:23:21.910" v="48017" actId="1076"/>
-          <ac:spMkLst>
-            <pc:docMk/>
-            <pc:sldMk cId="2311054438" sldId="359"/>
-            <ac:spMk id="162" creationId="{7CDBFE12-8479-31E4-7D6A-AD4FD9C3E0C5}"/>
-          </ac:spMkLst>
-        </pc:spChg>
-        <pc:spChg chg="mod">
-          <ac:chgData name="Dominik Dold" userId="f2e3d405450aa2f4" providerId="LiveId" clId="{5805CB45-291F-49AE-A1B6-715AA1DB6F91}" dt="2026-01-14T15:28:49.523" v="48416" actId="20577"/>
-          <ac:spMkLst>
-            <pc:docMk/>
-            <pc:sldMk cId="2311054438" sldId="359"/>
-            <ac:spMk id="163" creationId="{E9760FAC-52B1-C66C-16B6-8A6FA467EEB3}"/>
-          </ac:spMkLst>
-        </pc:spChg>
-        <pc:grpChg chg="mod">
-          <ac:chgData name="Dominik Dold" userId="f2e3d405450aa2f4" providerId="LiveId" clId="{5805CB45-291F-49AE-A1B6-715AA1DB6F91}" dt="2026-01-14T15:18:37.154" v="47604" actId="1076"/>
-          <ac:grpSpMkLst>
-            <pc:docMk/>
-            <pc:sldMk cId="2311054438" sldId="359"/>
-            <ac:grpSpMk id="153" creationId="{4DEF013B-BB94-E0FE-A88E-6FCA1F43FBA0}"/>
-          </ac:grpSpMkLst>
-        </pc:grpChg>
-      </pc:sldChg>
-      <pc:sldChg chg="addSp modSp add del mod modAnim">
-        <pc:chgData name="Dominik Dold" userId="f2e3d405450aa2f4" providerId="LiveId" clId="{5805CB45-291F-49AE-A1B6-715AA1DB6F91}" dt="2026-01-14T18:54:30.299" v="49126" actId="47"/>
-        <pc:sldMkLst>
-          <pc:docMk/>
-          <pc:sldMk cId="1119742054" sldId="360"/>
-        </pc:sldMkLst>
-        <pc:spChg chg="add mod">
-          <ac:chgData name="Dominik Dold" userId="f2e3d405450aa2f4" providerId="LiveId" clId="{5805CB45-291F-49AE-A1B6-715AA1DB6F91}" dt="2026-01-14T15:36:50.890" v="49054" actId="20577"/>
-          <ac:spMkLst>
-            <pc:docMk/>
-            <pc:sldMk cId="1119742054" sldId="360"/>
-            <ac:spMk id="4" creationId="{6329189E-852F-F342-0C8B-2B84CB27511E}"/>
-          </ac:spMkLst>
-        </pc:spChg>
-        <pc:spChg chg="add mod">
-          <ac:chgData name="Dominik Dold" userId="f2e3d405450aa2f4" providerId="LiveId" clId="{5805CB45-291F-49AE-A1B6-715AA1DB6F91}" dt="2026-01-14T15:37:31.268" v="49066" actId="1076"/>
-          <ac:spMkLst>
-            <pc:docMk/>
-            <pc:sldMk cId="1119742054" sldId="360"/>
-            <ac:spMk id="6" creationId="{EACE8F44-1EE1-342F-C227-F8531E174ADA}"/>
-          </ac:spMkLst>
-        </pc:spChg>
-        <pc:spChg chg="add mod">
-          <ac:chgData name="Dominik Dold" userId="f2e3d405450aa2f4" providerId="LiveId" clId="{5805CB45-291F-49AE-A1B6-715AA1DB6F91}" dt="2026-01-14T15:37:27.423" v="49065" actId="1076"/>
-          <ac:spMkLst>
-            <pc:docMk/>
-            <pc:sldMk cId="1119742054" sldId="360"/>
-            <ac:spMk id="8" creationId="{ADDE7D83-AA4F-9E13-BFBF-22EE8DF41F93}"/>
-          </ac:spMkLst>
-        </pc:spChg>
-        <pc:spChg chg="mod">
-          <ac:chgData name="Dominik Dold" userId="f2e3d405450aa2f4" providerId="LiveId" clId="{5805CB45-291F-49AE-A1B6-715AA1DB6F91}" dt="2026-01-14T15:37:10.579" v="49060" actId="1076"/>
-          <ac:spMkLst>
-            <pc:docMk/>
-            <pc:sldMk cId="1119742054" sldId="360"/>
-            <ac:spMk id="154" creationId="{8608B768-9FE4-9A99-73B9-22F634ECD38F}"/>
-          </ac:spMkLst>
-        </pc:spChg>
-      </pc:sldChg>
-      <pc:sldChg chg="add del modAnim">
-        <pc:chgData name="Dominik Dold" userId="f2e3d405450aa2f4" providerId="LiveId" clId="{5805CB45-291F-49AE-A1B6-715AA1DB6F91}" dt="2026-01-14T18:54:30.299" v="49126" actId="47"/>
-        <pc:sldMkLst>
-          <pc:docMk/>
-          <pc:sldMk cId="2023312961" sldId="361"/>
-        </pc:sldMkLst>
-      </pc:sldChg>
+            <pc:sldMasterMk cId="3647615518" sldId="2147483730"/>
+            <pc:sldLayoutMk cId="2515466704" sldId="2147483737"/>
+          </pc:sldLayoutMkLst>
+          <pc:spChg chg="del">
+            <ac:chgData name="Dominik Dold" userId="f2e3d405450aa2f4" providerId="LiveId" clId="{5805CB45-291F-49AE-A1B6-715AA1DB6F91}" dt="2026-01-19T16:34:12.392" v="49166" actId="478"/>
+            <ac:spMkLst>
+              <pc:docMk/>
+              <pc:sldMasterMk cId="3647615518" sldId="2147483730"/>
+              <pc:sldLayoutMk cId="2515466704" sldId="2147483737"/>
+              <ac:spMk id="4" creationId="{2933E148-CF42-4205-B6F8-3B728CF7C4C5}"/>
+            </ac:spMkLst>
+          </pc:spChg>
+          <pc:spChg chg="del">
+            <ac:chgData name="Dominik Dold" userId="f2e3d405450aa2f4" providerId="LiveId" clId="{5805CB45-291F-49AE-A1B6-715AA1DB6F91}" dt="2026-01-19T16:34:13.401" v="49168" actId="478"/>
+            <ac:spMkLst>
+              <pc:docMk/>
+              <pc:sldMasterMk cId="3647615518" sldId="2147483730"/>
+              <pc:sldLayoutMk cId="2515466704" sldId="2147483737"/>
+              <ac:spMk id="5" creationId="{9C99D05B-973C-1FB5-7278-033AF9D8F9A2}"/>
+            </ac:spMkLst>
+          </pc:spChg>
+          <pc:picChg chg="del">
+            <ac:chgData name="Dominik Dold" userId="f2e3d405450aa2f4" providerId="LiveId" clId="{5805CB45-291F-49AE-A1B6-715AA1DB6F91}" dt="2026-01-19T16:34:12.841" v="49167" actId="478"/>
+            <ac:picMkLst>
+              <pc:docMk/>
+              <pc:sldMasterMk cId="3647615518" sldId="2147483730"/>
+              <pc:sldLayoutMk cId="2515466704" sldId="2147483737"/>
+              <ac:picMk id="3" creationId="{8019FAC9-9AF7-E084-7654-F3C01ADF7059}"/>
+            </ac:picMkLst>
+          </pc:picChg>
+        </pc:sldLayoutChg>
+      </pc:sldMasterChg>
     </pc:docChg>
   </pc:docChgLst>
 </pc:chgInfo>
@@ -2353,7 +760,7 @@
           <a:p>
             <a:fld id="{5ECCE08E-FD48-4ABE-9805-2EBFDE106AB3}" type="datetimeFigureOut">
               <a:rPr lang="en-GB" smtClean="0"/>
-              <a:t>14/01/2026</a:t>
+              <a:t>19/01/2026</a:t>
             </a:fld>
             <a:endParaRPr lang="en-GB"/>
           </a:p>
@@ -3180,7 +1587,7 @@
           <a:p>
             <a:fld id="{CBE30051-C6DB-4954-8A39-7BBB06410C9B}" type="datetime1">
               <a:rPr lang="en-GB" smtClean="0"/>
-              <a:t>14/01/2026</a:t>
+              <a:t>19/01/2026</a:t>
             </a:fld>
             <a:endParaRPr lang="en-GB"/>
           </a:p>
@@ -3369,7 +1776,7 @@
           <a:p>
             <a:fld id="{3D7C210B-129B-4959-BC37-B5393D6AEA88}" type="datetime1">
               <a:rPr lang="en-GB" smtClean="0"/>
-              <a:t>14/01/2026</a:t>
+              <a:t>19/01/2026</a:t>
             </a:fld>
             <a:endParaRPr lang="en-GB"/>
           </a:p>
@@ -3568,7 +1975,7 @@
           <a:p>
             <a:fld id="{742CE41D-2DBF-4108-A0A6-B66ADCBB53B9}" type="datetime1">
               <a:rPr lang="en-GB" smtClean="0"/>
-              <a:t>14/01/2026</a:t>
+              <a:t>19/01/2026</a:t>
             </a:fld>
             <a:endParaRPr lang="en-GB"/>
           </a:p>
@@ -3836,192 +2243,6 @@
           <a:chExt cx="0" cy="0"/>
         </a:xfrm>
       </p:grpSpPr>
-      <p:pic>
-        <p:nvPicPr>
-          <p:cNvPr id="3" name="Picture 2" descr="A black and white image of a brain&#10;&#10;Description automatically generated">
-            <a:extLst>
-              <a:ext uri="{FF2B5EF4-FFF2-40B4-BE49-F238E27FC236}">
-                <a16:creationId xmlns:a16="http://schemas.microsoft.com/office/drawing/2014/main" id="{8019FAC9-9AF7-E084-7654-F3C01ADF7059}"/>
-              </a:ext>
-            </a:extLst>
-          </p:cNvPr>
-          <p:cNvPicPr>
-            <a:picLocks noChangeAspect="1"/>
-          </p:cNvPicPr>
-          <p:nvPr userDrawn="1"/>
-        </p:nvPicPr>
-        <p:blipFill>
-          <a:blip r:embed="rId2">
-            <a:extLst>
-              <a:ext uri="{28A0092B-C50C-407E-A947-70E740481C1C}">
-                <a14:useLocalDpi xmlns:a14="http://schemas.microsoft.com/office/drawing/2010/main" val="0"/>
-              </a:ext>
-            </a:extLst>
-          </a:blip>
-          <a:stretch>
-            <a:fillRect/>
-          </a:stretch>
-        </p:blipFill>
-        <p:spPr>
-          <a:xfrm>
-            <a:off x="0" y="7169"/>
-            <a:ext cx="12192000" cy="6858000"/>
-          </a:xfrm>
-          <a:prstGeom prst="rect">
-            <a:avLst/>
-          </a:prstGeom>
-        </p:spPr>
-      </p:pic>
-      <p:sp>
-        <p:nvSpPr>
-          <p:cNvPr id="4" name="Rectangle 3">
-            <a:extLst>
-              <a:ext uri="{FF2B5EF4-FFF2-40B4-BE49-F238E27FC236}">
-                <a16:creationId xmlns:a16="http://schemas.microsoft.com/office/drawing/2014/main" id="{2933E148-CF42-4205-B6F8-3B728CF7C4C5}"/>
-              </a:ext>
-            </a:extLst>
-          </p:cNvPr>
-          <p:cNvSpPr/>
-          <p:nvPr userDrawn="1"/>
-        </p:nvSpPr>
-        <p:spPr>
-          <a:xfrm>
-            <a:off x="0" y="-21507"/>
-            <a:ext cx="12191998" cy="3336207"/>
-          </a:xfrm>
-          <a:prstGeom prst="rect">
-            <a:avLst/>
-          </a:prstGeom>
-          <a:gradFill flip="none" rotWithShape="1">
-            <a:gsLst>
-              <a:gs pos="0">
-                <a:srgbClr val="E3EEF8">
-                  <a:lumMod val="0"/>
-                  <a:lumOff val="100000"/>
-                </a:srgbClr>
-              </a:gs>
-              <a:gs pos="44000">
-                <a:schemeClr val="accent1">
-                  <a:alpha val="85000"/>
-                  <a:lumMod val="0"/>
-                  <a:lumOff val="100000"/>
-                </a:schemeClr>
-              </a:gs>
-              <a:gs pos="100000">
-                <a:schemeClr val="accent1">
-                  <a:lumMod val="0"/>
-                  <a:lumOff val="100000"/>
-                  <a:alpha val="0"/>
-                </a:schemeClr>
-              </a:gs>
-            </a:gsLst>
-            <a:lin ang="16200000" scaled="1"/>
-            <a:tileRect/>
-          </a:gradFill>
-          <a:ln>
-            <a:noFill/>
-          </a:ln>
-        </p:spPr>
-        <p:style>
-          <a:lnRef idx="2">
-            <a:schemeClr val="accent1">
-              <a:shade val="15000"/>
-            </a:schemeClr>
-          </a:lnRef>
-          <a:fillRef idx="1">
-            <a:schemeClr val="accent1"/>
-          </a:fillRef>
-          <a:effectRef idx="0">
-            <a:schemeClr val="accent1"/>
-          </a:effectRef>
-          <a:fontRef idx="minor">
-            <a:schemeClr val="lt1"/>
-          </a:fontRef>
-        </p:style>
-        <p:txBody>
-          <a:bodyPr rtlCol="0" anchor="ctr"/>
-          <a:lstStyle/>
-          <a:p>
-            <a:pPr algn="ctr"/>
-            <a:endParaRPr lang="en-AT"/>
-          </a:p>
-        </p:txBody>
-      </p:sp>
-      <p:sp>
-        <p:nvSpPr>
-          <p:cNvPr id="5" name="Rectangle 4">
-            <a:extLst>
-              <a:ext uri="{FF2B5EF4-FFF2-40B4-BE49-F238E27FC236}">
-                <a16:creationId xmlns:a16="http://schemas.microsoft.com/office/drawing/2014/main" id="{9C99D05B-973C-1FB5-7278-033AF9D8F9A2}"/>
-              </a:ext>
-            </a:extLst>
-          </p:cNvPr>
-          <p:cNvSpPr/>
-          <p:nvPr userDrawn="1"/>
-        </p:nvSpPr>
-        <p:spPr>
-          <a:xfrm rot="10800000">
-            <a:off x="0" y="3314699"/>
-            <a:ext cx="12191998" cy="3550469"/>
-          </a:xfrm>
-          <a:prstGeom prst="rect">
-            <a:avLst/>
-          </a:prstGeom>
-          <a:gradFill flip="none" rotWithShape="1">
-            <a:gsLst>
-              <a:gs pos="0">
-                <a:srgbClr val="E3EEF8">
-                  <a:lumMod val="0"/>
-                  <a:lumOff val="100000"/>
-                </a:srgbClr>
-              </a:gs>
-              <a:gs pos="44000">
-                <a:schemeClr val="accent1">
-                  <a:alpha val="85000"/>
-                  <a:lumMod val="0"/>
-                  <a:lumOff val="100000"/>
-                </a:schemeClr>
-              </a:gs>
-              <a:gs pos="100000">
-                <a:schemeClr val="accent1">
-                  <a:lumMod val="0"/>
-                  <a:lumOff val="100000"/>
-                  <a:alpha val="0"/>
-                </a:schemeClr>
-              </a:gs>
-            </a:gsLst>
-            <a:lin ang="16200000" scaled="1"/>
-            <a:tileRect/>
-          </a:gradFill>
-          <a:ln>
-            <a:noFill/>
-          </a:ln>
-        </p:spPr>
-        <p:style>
-          <a:lnRef idx="2">
-            <a:schemeClr val="accent1">
-              <a:shade val="15000"/>
-            </a:schemeClr>
-          </a:lnRef>
-          <a:fillRef idx="1">
-            <a:schemeClr val="accent1"/>
-          </a:fillRef>
-          <a:effectRef idx="0">
-            <a:schemeClr val="accent1"/>
-          </a:effectRef>
-          <a:fontRef idx="minor">
-            <a:schemeClr val="lt1"/>
-          </a:fontRef>
-        </p:style>
-        <p:txBody>
-          <a:bodyPr rtlCol="0" anchor="ctr"/>
-          <a:lstStyle/>
-          <a:p>
-            <a:pPr algn="ctr"/>
-            <a:endParaRPr lang="en-AT"/>
-          </a:p>
-        </p:txBody>
-      </p:sp>
       <p:sp>
         <p:nvSpPr>
           <p:cNvPr id="6" name="Title 1">
@@ -4097,227 +2318,6 @@
           <a:chExt cx="0" cy="0"/>
         </a:xfrm>
       </p:grpSpPr>
-      <p:grpSp>
-        <p:nvGrpSpPr>
-          <p:cNvPr id="13" name="Group 12">
-            <a:extLst>
-              <a:ext uri="{FF2B5EF4-FFF2-40B4-BE49-F238E27FC236}">
-                <a16:creationId xmlns:a16="http://schemas.microsoft.com/office/drawing/2014/main" id="{EC79674F-EEE7-A3F7-E7B6-E090E34DAE77}"/>
-              </a:ext>
-            </a:extLst>
-          </p:cNvPr>
-          <p:cNvGrpSpPr/>
-          <p:nvPr userDrawn="1"/>
-        </p:nvGrpSpPr>
-        <p:grpSpPr>
-          <a:xfrm>
-            <a:off x="0" y="0"/>
-            <a:ext cx="12192000" cy="6858000"/>
-            <a:chOff x="0" y="0"/>
-            <a:chExt cx="12192000" cy="6858000"/>
-          </a:xfrm>
-        </p:grpSpPr>
-        <p:pic>
-          <p:nvPicPr>
-            <p:cNvPr id="11" name="Picture 10">
-              <a:extLst>
-                <a:ext uri="{FF2B5EF4-FFF2-40B4-BE49-F238E27FC236}">
-                  <a16:creationId xmlns:a16="http://schemas.microsoft.com/office/drawing/2014/main" id="{14F97D08-59F5-690E-D135-2A5264455DAB}"/>
-                </a:ext>
-              </a:extLst>
-            </p:cNvPr>
-            <p:cNvPicPr>
-              <a:picLocks noChangeAspect="1"/>
-            </p:cNvPicPr>
-            <p:nvPr userDrawn="1"/>
-          </p:nvPicPr>
-          <p:blipFill>
-            <a:blip r:embed="rId2">
-              <a:extLst>
-                <a:ext uri="{28A0092B-C50C-407E-A947-70E740481C1C}">
-                  <a14:useLocalDpi xmlns:a14="http://schemas.microsoft.com/office/drawing/2010/main" val="0"/>
-                </a:ext>
-              </a:extLst>
-            </a:blip>
-            <a:stretch>
-              <a:fillRect/>
-            </a:stretch>
-          </p:blipFill>
-          <p:spPr>
-            <a:xfrm>
-              <a:off x="0" y="0"/>
-              <a:ext cx="12192000" cy="6858000"/>
-            </a:xfrm>
-            <a:prstGeom prst="rect">
-              <a:avLst/>
-            </a:prstGeom>
-          </p:spPr>
-        </p:pic>
-        <p:sp>
-          <p:nvSpPr>
-            <p:cNvPr id="12" name="Rectangle 11">
-              <a:extLst>
-                <a:ext uri="{FF2B5EF4-FFF2-40B4-BE49-F238E27FC236}">
-                  <a16:creationId xmlns:a16="http://schemas.microsoft.com/office/drawing/2014/main" id="{261ACB7E-6B9B-F069-4767-E614377BA33D}"/>
-                </a:ext>
-              </a:extLst>
-            </p:cNvPr>
-            <p:cNvSpPr/>
-            <p:nvPr userDrawn="1"/>
-          </p:nvSpPr>
-          <p:spPr>
-            <a:xfrm>
-              <a:off x="0" y="0"/>
-              <a:ext cx="12192000" cy="6858000"/>
-            </a:xfrm>
-            <a:prstGeom prst="rect">
-              <a:avLst/>
-            </a:prstGeom>
-            <a:solidFill>
-              <a:schemeClr val="bg1">
-                <a:alpha val="88000"/>
-              </a:schemeClr>
-            </a:solidFill>
-          </p:spPr>
-          <p:style>
-            <a:lnRef idx="2">
-              <a:schemeClr val="accent1">
-                <a:shade val="50000"/>
-              </a:schemeClr>
-            </a:lnRef>
-            <a:fillRef idx="1">
-              <a:schemeClr val="accent1"/>
-            </a:fillRef>
-            <a:effectRef idx="0">
-              <a:schemeClr val="accent1"/>
-            </a:effectRef>
-            <a:fontRef idx="minor">
-              <a:schemeClr val="lt1"/>
-            </a:fontRef>
-          </p:style>
-          <p:txBody>
-            <a:bodyPr rtlCol="0" anchor="ctr"/>
-            <a:lstStyle/>
-            <a:p>
-              <a:pPr algn="ctr"/>
-              <a:endParaRPr lang="en-NL"/>
-            </a:p>
-          </p:txBody>
-        </p:sp>
-      </p:grpSp>
-      <p:pic>
-        <p:nvPicPr>
-          <p:cNvPr id="7" name="Picture 6" descr="A brain with circuit board&#10;&#10;Description automatically generated">
-            <a:extLst>
-              <a:ext uri="{FF2B5EF4-FFF2-40B4-BE49-F238E27FC236}">
-                <a16:creationId xmlns:a16="http://schemas.microsoft.com/office/drawing/2014/main" id="{71D72719-C124-A965-D48D-9233DB44E3E0}"/>
-              </a:ext>
-            </a:extLst>
-          </p:cNvPr>
-          <p:cNvPicPr>
-            <a:picLocks noChangeAspect="1"/>
-          </p:cNvPicPr>
-          <p:nvPr userDrawn="1"/>
-        </p:nvPicPr>
-        <p:blipFill rotWithShape="1">
-          <a:blip r:embed="rId3">
-            <a:extLst>
-              <a:ext uri="{28A0092B-C50C-407E-A947-70E740481C1C}">
-                <a14:useLocalDpi xmlns:a14="http://schemas.microsoft.com/office/drawing/2010/main" val="0"/>
-              </a:ext>
-            </a:extLst>
-          </a:blip>
-          <a:srcRect t="17601" b="26149"/>
-          <a:stretch/>
-        </p:blipFill>
-        <p:spPr>
-          <a:xfrm>
-            <a:off x="0" y="1"/>
-            <a:ext cx="12192000" cy="6858000"/>
-          </a:xfrm>
-          <a:prstGeom prst="rect">
-            <a:avLst/>
-          </a:prstGeom>
-          <a:noFill/>
-        </p:spPr>
-      </p:pic>
-      <p:sp>
-        <p:nvSpPr>
-          <p:cNvPr id="8" name="Rectangle 7">
-            <a:extLst>
-              <a:ext uri="{FF2B5EF4-FFF2-40B4-BE49-F238E27FC236}">
-                <a16:creationId xmlns:a16="http://schemas.microsoft.com/office/drawing/2014/main" id="{F26C7911-7E19-CC38-D210-8AA48256FC58}"/>
-              </a:ext>
-            </a:extLst>
-          </p:cNvPr>
-          <p:cNvSpPr/>
-          <p:nvPr userDrawn="1"/>
-        </p:nvSpPr>
-        <p:spPr>
-          <a:xfrm>
-            <a:off x="1" y="-7169"/>
-            <a:ext cx="12191999" cy="6858000"/>
-          </a:xfrm>
-          <a:prstGeom prst="rect">
-            <a:avLst/>
-          </a:prstGeom>
-          <a:gradFill flip="none" rotWithShape="1">
-            <a:gsLst>
-              <a:gs pos="42000">
-                <a:srgbClr val="FBFDFE">
-                  <a:alpha val="84000"/>
-                </a:srgbClr>
-              </a:gs>
-              <a:gs pos="0">
-                <a:srgbClr val="E3EEF8">
-                  <a:lumMod val="0"/>
-                  <a:lumOff val="100000"/>
-                </a:srgbClr>
-              </a:gs>
-              <a:gs pos="62000">
-                <a:schemeClr val="accent1">
-                  <a:lumMod val="5000"/>
-                  <a:lumOff val="95000"/>
-                  <a:alpha val="71000"/>
-                </a:schemeClr>
-              </a:gs>
-              <a:gs pos="55000">
-                <a:schemeClr val="accent1">
-                  <a:lumMod val="30000"/>
-                  <a:lumOff val="70000"/>
-                  <a:alpha val="0"/>
-                </a:schemeClr>
-              </a:gs>
-            </a:gsLst>
-            <a:lin ang="18000000" scaled="0"/>
-            <a:tileRect/>
-          </a:gradFill>
-        </p:spPr>
-        <p:style>
-          <a:lnRef idx="2">
-            <a:schemeClr val="accent1">
-              <a:shade val="15000"/>
-            </a:schemeClr>
-          </a:lnRef>
-          <a:fillRef idx="1">
-            <a:schemeClr val="accent1"/>
-          </a:fillRef>
-          <a:effectRef idx="0">
-            <a:schemeClr val="accent1"/>
-          </a:effectRef>
-          <a:fontRef idx="minor">
-            <a:schemeClr val="lt1"/>
-          </a:fontRef>
-        </p:style>
-        <p:txBody>
-          <a:bodyPr rtlCol="0" anchor="ctr"/>
-          <a:lstStyle/>
-          <a:p>
-            <a:pPr algn="ctr"/>
-            <a:endParaRPr lang="en-AT"/>
-          </a:p>
-        </p:txBody>
-      </p:sp>
     </p:spTree>
     <p:extLst>
       <p:ext uri="{BB962C8B-B14F-4D97-AF65-F5344CB8AC3E}">
@@ -4514,7 +2514,7 @@
           <a:p>
             <a:fld id="{14CB3D7D-A06C-4DE9-992B-5B65F53834D9}" type="datetime1">
               <a:rPr lang="en-GB" smtClean="0"/>
-              <a:t>14/01/2026</a:t>
+              <a:t>19/01/2026</a:t>
             </a:fld>
             <a:endParaRPr lang="en-GB"/>
           </a:p>
@@ -4880,7 +2880,7 @@
           <a:p>
             <a:fld id="{C67A38C1-9379-4361-9946-D3680B7F47FE}" type="datetime1">
               <a:rPr lang="en-GB" smtClean="0"/>
-              <a:t>14/01/2026</a:t>
+              <a:t>19/01/2026</a:t>
             </a:fld>
             <a:endParaRPr lang="en-GB"/>
           </a:p>
@@ -5017,7 +3017,7 @@
           <a:p>
             <a:fld id="{B9C7243E-F364-48F3-BBAD-37A743E237B4}" type="datetime1">
               <a:rPr lang="en-GB" smtClean="0"/>
-              <a:t>14/01/2026</a:t>
+              <a:t>19/01/2026</a:t>
             </a:fld>
             <a:endParaRPr lang="en-GB"/>
           </a:p>
@@ -5423,7 +3423,7 @@
           <a:p>
             <a:fld id="{5FC0CC01-3EBF-4DED-A29A-5DE22DB44D36}" type="datetime1">
               <a:rPr lang="en-GB" smtClean="0"/>
-              <a:t>14/01/2026</a:t>
+              <a:t>19/01/2026</a:t>
             </a:fld>
             <a:endParaRPr lang="en-GB"/>
           </a:p>
@@ -5659,7 +3659,7 @@
           <a:p>
             <a:fld id="{9CDC136D-BBC1-4797-AC59-38B61BEC7FD1}" type="datetime1">
               <a:rPr lang="en-GB" smtClean="0"/>
-              <a:t>14/01/2026</a:t>
+              <a:t>19/01/2026</a:t>
             </a:fld>
             <a:endParaRPr lang="en-GB"/>
           </a:p>
@@ -6131,8 +4131,8 @@
           </a:p>
         </p:txBody>
       </p:sp>
-      <mc:AlternateContent xmlns:mc="http://schemas.openxmlformats.org/markup-compatibility/2006">
-        <mc:Choice xmlns:a14="http://schemas.microsoft.com/office/drawing/2010/main" Requires="a14">
+      <mc:AlternateContent xmlns:mc="http://schemas.openxmlformats.org/markup-compatibility/2006" xmlns:a14="http://schemas.microsoft.com/office/drawing/2010/main">
+        <mc:Choice Requires="a14">
           <p:sp>
             <p:nvSpPr>
               <p:cNvPr id="10" name="TextBox 9">
@@ -6198,7 +4198,7 @@
             </p:txBody>
           </p:sp>
         </mc:Choice>
-        <mc:Fallback>
+        <mc:Fallback xmlns="">
           <p:sp>
             <p:nvSpPr>
               <p:cNvPr id="10" name="TextBox 9">
@@ -7444,8 +5444,8 @@
           </a:p>
         </p:txBody>
       </p:sp>
-      <mc:AlternateContent xmlns:mc="http://schemas.openxmlformats.org/markup-compatibility/2006">
-        <mc:Choice xmlns:a14="http://schemas.microsoft.com/office/drawing/2010/main" Requires="a14">
+      <mc:AlternateContent xmlns:mc="http://schemas.openxmlformats.org/markup-compatibility/2006" xmlns:a14="http://schemas.microsoft.com/office/drawing/2010/main">
+        <mc:Choice Requires="a14">
           <p:sp>
             <p:nvSpPr>
               <p:cNvPr id="31" name="TextBox 30">
@@ -7585,7 +5585,7 @@
             </p:txBody>
           </p:sp>
         </mc:Choice>
-        <mc:Fallback>
+        <mc:Fallback xmlns="">
           <p:sp>
             <p:nvSpPr>
               <p:cNvPr id="31" name="TextBox 30">

</xml_diff>